<commit_message>
add rdf geenration to presenation
</commit_message>
<xml_diff>
--- a/Presentation/final.pptx
+++ b/Presentation/final.pptx
@@ -5,10 +5,10 @@
     <p:sldMasterId id="2147483728" r:id="rId2"/>
   </p:sldMasterIdLst>
   <p:notesMasterIdLst>
-    <p:notesMasterId r:id="rId12"/>
+    <p:notesMasterId r:id="rId16"/>
   </p:notesMasterIdLst>
   <p:handoutMasterIdLst>
-    <p:handoutMasterId r:id="rId13"/>
+    <p:handoutMasterId r:id="rId17"/>
   </p:handoutMasterIdLst>
   <p:sldIdLst>
     <p:sldId id="257" r:id="rId3"/>
@@ -19,7 +19,11 @@
     <p:sldId id="269" r:id="rId8"/>
     <p:sldId id="281" r:id="rId9"/>
     <p:sldId id="282" r:id="rId10"/>
-    <p:sldId id="265" r:id="rId11"/>
+    <p:sldId id="270" r:id="rId11"/>
+    <p:sldId id="283" r:id="rId12"/>
+    <p:sldId id="284" r:id="rId13"/>
+    <p:sldId id="285" r:id="rId14"/>
+    <p:sldId id="265" r:id="rId15"/>
   </p:sldIdLst>
   <p:sldSz cx="12192000" cy="6858000"/>
   <p:notesSz cx="6858000" cy="9144000"/>
@@ -4755,6 +4759,712 @@
 </p:sld>
 </file>
 
+<file path=ppt/slides/slide10.xml><?xml version="1.0" encoding="utf-8"?>
+<p:sld xmlns:a="http://schemas.openxmlformats.org/drawingml/2006/main" xmlns:r="http://schemas.openxmlformats.org/officeDocument/2006/relationships" xmlns:p="http://schemas.openxmlformats.org/presentationml/2006/main">
+  <p:cSld>
+    <p:spTree>
+      <p:nvGrpSpPr>
+        <p:cNvPr id="1" name=""/>
+        <p:cNvGrpSpPr/>
+        <p:nvPr/>
+      </p:nvGrpSpPr>
+      <p:grpSpPr>
+        <a:xfrm>
+          <a:off x="0" y="0"/>
+          <a:ext cx="0" cy="0"/>
+          <a:chOff x="0" y="0"/>
+          <a:chExt cx="0" cy="0"/>
+        </a:xfrm>
+      </p:grpSpPr>
+      <p:sp>
+        <p:nvSpPr>
+          <p:cNvPr id="2" name="Content Placeholder 1">
+            <a:extLst>
+              <a:ext uri="{FF2B5EF4-FFF2-40B4-BE49-F238E27FC236}">
+                <a16:creationId xmlns:a16="http://schemas.microsoft.com/office/drawing/2014/main" id="{E5D6D701-391F-E6DB-57E2-2F0095070A41}"/>
+              </a:ext>
+            </a:extLst>
+          </p:cNvPr>
+          <p:cNvSpPr>
+            <a:spLocks noGrp="1"/>
+          </p:cNvSpPr>
+          <p:nvPr>
+            <p:ph sz="half" idx="1"/>
+          </p:nvPr>
+        </p:nvSpPr>
+        <p:spPr/>
+        <p:txBody>
+          <a:bodyPr/>
+          <a:lstStyle/>
+          <a:p>
+            <a:r>
+              <a:rPr lang="en-AT" dirty="0"/>
+              <a:t>Assignment misundersttod at first</a:t>
+            </a:r>
+          </a:p>
+          <a:p>
+            <a:r>
+              <a:rPr lang="en-AT" dirty="0"/>
+              <a:t>RDF generation directly</a:t>
+            </a:r>
+          </a:p>
+          <a:p>
+            <a:r>
+              <a:rPr lang="en-AT" dirty="0"/>
+              <a:t>Still good result</a:t>
+            </a:r>
+          </a:p>
+        </p:txBody>
+      </p:sp>
+      <p:pic>
+        <p:nvPicPr>
+          <p:cNvPr id="9" name="Content Placeholder 8" descr="A computer screen shot of a program&#10;&#10;Description automatically generated">
+            <a:extLst>
+              <a:ext uri="{FF2B5EF4-FFF2-40B4-BE49-F238E27FC236}">
+                <a16:creationId xmlns:a16="http://schemas.microsoft.com/office/drawing/2014/main" id="{3E4F22D9-4099-2B03-829E-5786F92D229B}"/>
+              </a:ext>
+            </a:extLst>
+          </p:cNvPr>
+          <p:cNvPicPr>
+            <a:picLocks noGrp="1" noChangeAspect="1"/>
+          </p:cNvPicPr>
+          <p:nvPr>
+            <p:ph sz="half" idx="13"/>
+          </p:nvPr>
+        </p:nvPicPr>
+        <p:blipFill>
+          <a:blip r:embed="rId2"/>
+          <a:stretch>
+            <a:fillRect/>
+          </a:stretch>
+        </p:blipFill>
+        <p:spPr>
+          <a:xfrm>
+            <a:off x="6594475" y="1240631"/>
+            <a:ext cx="4775200" cy="4521200"/>
+          </a:xfrm>
+        </p:spPr>
+      </p:pic>
+      <p:sp>
+        <p:nvSpPr>
+          <p:cNvPr id="4" name="Title 3">
+            <a:extLst>
+              <a:ext uri="{FF2B5EF4-FFF2-40B4-BE49-F238E27FC236}">
+                <a16:creationId xmlns:a16="http://schemas.microsoft.com/office/drawing/2014/main" id="{1EBC88CA-ED28-3272-B88A-C49CC943F78C}"/>
+              </a:ext>
+            </a:extLst>
+          </p:cNvPr>
+          <p:cNvSpPr>
+            <a:spLocks noGrp="1"/>
+          </p:cNvSpPr>
+          <p:nvPr>
+            <p:ph type="ctrTitle"/>
+          </p:nvPr>
+        </p:nvSpPr>
+        <p:spPr/>
+        <p:txBody>
+          <a:bodyPr/>
+          <a:lstStyle/>
+          <a:p>
+            <a:r>
+              <a:rPr lang="en-AT" dirty="0"/>
+              <a:t>RDF Generation – Zero-Shot</a:t>
+            </a:r>
+          </a:p>
+        </p:txBody>
+      </p:sp>
+      <p:sp>
+        <p:nvSpPr>
+          <p:cNvPr id="5" name="Footer Placeholder 4">
+            <a:extLst>
+              <a:ext uri="{FF2B5EF4-FFF2-40B4-BE49-F238E27FC236}">
+                <a16:creationId xmlns:a16="http://schemas.microsoft.com/office/drawing/2014/main" id="{D0790362-69A5-BCCD-1311-6F62CEE2A058}"/>
+              </a:ext>
+            </a:extLst>
+          </p:cNvPr>
+          <p:cNvSpPr>
+            <a:spLocks noGrp="1"/>
+          </p:cNvSpPr>
+          <p:nvPr>
+            <p:ph type="ftr" sz="quarter" idx="3"/>
+          </p:nvPr>
+        </p:nvSpPr>
+        <p:spPr/>
+        <p:txBody>
+          <a:bodyPr/>
+          <a:lstStyle/>
+          <a:p>
+            <a:r>
+              <a:rPr lang="de-DE"/>
+              <a:t>Titel oder Vortragender</a:t>
+            </a:r>
+            <a:endParaRPr lang="de-DE" dirty="0"/>
+          </a:p>
+        </p:txBody>
+      </p:sp>
+      <p:sp>
+        <p:nvSpPr>
+          <p:cNvPr id="6" name="Slide Number Placeholder 5">
+            <a:extLst>
+              <a:ext uri="{FF2B5EF4-FFF2-40B4-BE49-F238E27FC236}">
+                <a16:creationId xmlns:a16="http://schemas.microsoft.com/office/drawing/2014/main" id="{C5CDA4E4-1295-91BE-BE6D-1466C016A1C5}"/>
+              </a:ext>
+            </a:extLst>
+          </p:cNvPr>
+          <p:cNvSpPr>
+            <a:spLocks noGrp="1"/>
+          </p:cNvSpPr>
+          <p:nvPr>
+            <p:ph type="sldNum" sz="quarter" idx="4"/>
+          </p:nvPr>
+        </p:nvSpPr>
+        <p:spPr/>
+        <p:txBody>
+          <a:bodyPr/>
+          <a:lstStyle/>
+          <a:p>
+            <a:r>
+              <a:rPr lang="de-DE"/>
+              <a:t>Seite </a:t>
+            </a:r>
+            <a:fld id="{EBA229B5-7CFD-BC45-B1DD-7E8FA6FF2A01}" type="slidenum">
+              <a:rPr lang="de-DE" smtClean="0"/>
+              <a:pPr/>
+              <a:t>10</a:t>
+            </a:fld>
+            <a:endParaRPr lang="de-DE" dirty="0"/>
+          </a:p>
+        </p:txBody>
+      </p:sp>
+      <p:sp>
+        <p:nvSpPr>
+          <p:cNvPr id="7" name="Date Placeholder 6">
+            <a:extLst>
+              <a:ext uri="{FF2B5EF4-FFF2-40B4-BE49-F238E27FC236}">
+                <a16:creationId xmlns:a16="http://schemas.microsoft.com/office/drawing/2014/main" id="{0A1E56E0-6507-DBE2-8560-1147F85B0786}"/>
+              </a:ext>
+            </a:extLst>
+          </p:cNvPr>
+          <p:cNvSpPr>
+            <a:spLocks noGrp="1"/>
+          </p:cNvSpPr>
+          <p:nvPr>
+            <p:ph type="dt" sz="half" idx="2"/>
+          </p:nvPr>
+        </p:nvSpPr>
+        <p:spPr/>
+        <p:txBody>
+          <a:bodyPr/>
+          <a:lstStyle/>
+          <a:p>
+            <a:fld id="{7C3CDC0F-71BF-B840-812C-9588125E0BFE}" type="datetime6">
+              <a:rPr lang="de-DE" smtClean="0"/>
+              <a:pPr/>
+              <a:t>Januar 24</a:t>
+            </a:fld>
+            <a:endParaRPr lang="en-US" dirty="0"/>
+          </a:p>
+        </p:txBody>
+      </p:sp>
+      <p:pic>
+        <p:nvPicPr>
+          <p:cNvPr id="11" name="Picture 10" descr="A screenshot of a computer&#10;&#10;Description automatically generated">
+            <a:extLst>
+              <a:ext uri="{FF2B5EF4-FFF2-40B4-BE49-F238E27FC236}">
+                <a16:creationId xmlns:a16="http://schemas.microsoft.com/office/drawing/2014/main" id="{48639408-1CCA-273E-84B1-4C3F353AF9DD}"/>
+              </a:ext>
+            </a:extLst>
+          </p:cNvPr>
+          <p:cNvPicPr>
+            <a:picLocks noChangeAspect="1"/>
+          </p:cNvPicPr>
+          <p:nvPr/>
+        </p:nvPicPr>
+        <p:blipFill>
+          <a:blip r:embed="rId3"/>
+          <a:stretch>
+            <a:fillRect/>
+          </a:stretch>
+        </p:blipFill>
+        <p:spPr>
+          <a:xfrm>
+            <a:off x="766763" y="2811325"/>
+            <a:ext cx="4851400" cy="1651000"/>
+          </a:xfrm>
+          <a:prstGeom prst="rect">
+            <a:avLst/>
+          </a:prstGeom>
+        </p:spPr>
+      </p:pic>
+    </p:spTree>
+    <p:extLst>
+      <p:ext uri="{BB962C8B-B14F-4D97-AF65-F5344CB8AC3E}">
+        <p14:creationId xmlns:p14="http://schemas.microsoft.com/office/powerpoint/2010/main" val="3399557874"/>
+      </p:ext>
+    </p:extLst>
+  </p:cSld>
+  <p:clrMapOvr>
+    <a:masterClrMapping/>
+  </p:clrMapOvr>
+</p:sld>
+</file>
+
+<file path=ppt/slides/slide11.xml><?xml version="1.0" encoding="utf-8"?>
+<p:sld xmlns:a="http://schemas.openxmlformats.org/drawingml/2006/main" xmlns:r="http://schemas.openxmlformats.org/officeDocument/2006/relationships" xmlns:p="http://schemas.openxmlformats.org/presentationml/2006/main">
+  <p:cSld>
+    <p:spTree>
+      <p:nvGrpSpPr>
+        <p:cNvPr id="1" name="">
+          <a:extLst>
+            <a:ext uri="{FF2B5EF4-FFF2-40B4-BE49-F238E27FC236}">
+              <a16:creationId xmlns:a16="http://schemas.microsoft.com/office/drawing/2014/main" id="{08A1E334-69EA-ACF6-FB0D-8F01DE14DBF4}"/>
+            </a:ext>
+          </a:extLst>
+        </p:cNvPr>
+        <p:cNvGrpSpPr/>
+        <p:nvPr/>
+      </p:nvGrpSpPr>
+      <p:grpSpPr>
+        <a:xfrm>
+          <a:off x="0" y="0"/>
+          <a:ext cx="0" cy="0"/>
+          <a:chOff x="0" y="0"/>
+          <a:chExt cx="0" cy="0"/>
+        </a:xfrm>
+      </p:grpSpPr>
+      <p:sp>
+        <p:nvSpPr>
+          <p:cNvPr id="2" name="Content Placeholder 1">
+            <a:extLst>
+              <a:ext uri="{FF2B5EF4-FFF2-40B4-BE49-F238E27FC236}">
+                <a16:creationId xmlns:a16="http://schemas.microsoft.com/office/drawing/2014/main" id="{B87765A0-4DA6-5326-EA71-B803ADBB812D}"/>
+              </a:ext>
+            </a:extLst>
+          </p:cNvPr>
+          <p:cNvSpPr>
+            <a:spLocks noGrp="1"/>
+          </p:cNvSpPr>
+          <p:nvPr>
+            <p:ph sz="half" idx="1"/>
+          </p:nvPr>
+        </p:nvSpPr>
+        <p:spPr/>
+        <p:txBody>
+          <a:bodyPr/>
+          <a:lstStyle/>
+          <a:p>
+            <a:r>
+              <a:rPr lang="en-AT" dirty="0"/>
+              <a:t>Provided an example output additionally to instruction</a:t>
+            </a:r>
+          </a:p>
+          <a:p>
+            <a:r>
+              <a:rPr lang="en-AT" dirty="0"/>
+              <a:t>Clearly separated instruction from Task</a:t>
+            </a:r>
+          </a:p>
+          <a:p>
+            <a:endParaRPr lang="en-AT" dirty="0"/>
+          </a:p>
+        </p:txBody>
+      </p:sp>
+      <p:sp>
+        <p:nvSpPr>
+          <p:cNvPr id="4" name="Title 3">
+            <a:extLst>
+              <a:ext uri="{FF2B5EF4-FFF2-40B4-BE49-F238E27FC236}">
+                <a16:creationId xmlns:a16="http://schemas.microsoft.com/office/drawing/2014/main" id="{93295A0F-08C3-7CCC-C15D-1F372F710D90}"/>
+              </a:ext>
+            </a:extLst>
+          </p:cNvPr>
+          <p:cNvSpPr>
+            <a:spLocks noGrp="1"/>
+          </p:cNvSpPr>
+          <p:nvPr>
+            <p:ph type="ctrTitle"/>
+          </p:nvPr>
+        </p:nvSpPr>
+        <p:spPr/>
+        <p:txBody>
+          <a:bodyPr/>
+          <a:lstStyle/>
+          <a:p>
+            <a:r>
+              <a:rPr lang="en-AT" dirty="0"/>
+              <a:t>RDF Generation – One-Shot</a:t>
+            </a:r>
+          </a:p>
+        </p:txBody>
+      </p:sp>
+      <p:sp>
+        <p:nvSpPr>
+          <p:cNvPr id="5" name="Footer Placeholder 4">
+            <a:extLst>
+              <a:ext uri="{FF2B5EF4-FFF2-40B4-BE49-F238E27FC236}">
+                <a16:creationId xmlns:a16="http://schemas.microsoft.com/office/drawing/2014/main" id="{7ECA2972-CAB6-6D70-0FF0-238C70767080}"/>
+              </a:ext>
+            </a:extLst>
+          </p:cNvPr>
+          <p:cNvSpPr>
+            <a:spLocks noGrp="1"/>
+          </p:cNvSpPr>
+          <p:nvPr>
+            <p:ph type="ftr" sz="quarter" idx="3"/>
+          </p:nvPr>
+        </p:nvSpPr>
+        <p:spPr/>
+        <p:txBody>
+          <a:bodyPr/>
+          <a:lstStyle/>
+          <a:p>
+            <a:r>
+              <a:rPr lang="de-DE"/>
+              <a:t>Titel oder Vortragender</a:t>
+            </a:r>
+            <a:endParaRPr lang="de-DE" dirty="0"/>
+          </a:p>
+        </p:txBody>
+      </p:sp>
+      <p:sp>
+        <p:nvSpPr>
+          <p:cNvPr id="6" name="Slide Number Placeholder 5">
+            <a:extLst>
+              <a:ext uri="{FF2B5EF4-FFF2-40B4-BE49-F238E27FC236}">
+                <a16:creationId xmlns:a16="http://schemas.microsoft.com/office/drawing/2014/main" id="{CEBD3CB8-8594-E0C1-0AA0-7C88DFBA96DB}"/>
+              </a:ext>
+            </a:extLst>
+          </p:cNvPr>
+          <p:cNvSpPr>
+            <a:spLocks noGrp="1"/>
+          </p:cNvSpPr>
+          <p:nvPr>
+            <p:ph type="sldNum" sz="quarter" idx="4"/>
+          </p:nvPr>
+        </p:nvSpPr>
+        <p:spPr/>
+        <p:txBody>
+          <a:bodyPr/>
+          <a:lstStyle/>
+          <a:p>
+            <a:r>
+              <a:rPr lang="de-DE"/>
+              <a:t>Seite </a:t>
+            </a:r>
+            <a:fld id="{EBA229B5-7CFD-BC45-B1DD-7E8FA6FF2A01}" type="slidenum">
+              <a:rPr lang="de-DE" smtClean="0"/>
+              <a:pPr/>
+              <a:t>11</a:t>
+            </a:fld>
+            <a:endParaRPr lang="de-DE" dirty="0"/>
+          </a:p>
+        </p:txBody>
+      </p:sp>
+      <p:sp>
+        <p:nvSpPr>
+          <p:cNvPr id="7" name="Date Placeholder 6">
+            <a:extLst>
+              <a:ext uri="{FF2B5EF4-FFF2-40B4-BE49-F238E27FC236}">
+                <a16:creationId xmlns:a16="http://schemas.microsoft.com/office/drawing/2014/main" id="{42063949-A768-E987-02C2-045DF4BE3730}"/>
+              </a:ext>
+            </a:extLst>
+          </p:cNvPr>
+          <p:cNvSpPr>
+            <a:spLocks noGrp="1"/>
+          </p:cNvSpPr>
+          <p:nvPr>
+            <p:ph type="dt" sz="half" idx="2"/>
+          </p:nvPr>
+        </p:nvSpPr>
+        <p:spPr/>
+        <p:txBody>
+          <a:bodyPr/>
+          <a:lstStyle/>
+          <a:p>
+            <a:fld id="{7C3CDC0F-71BF-B840-812C-9588125E0BFE}" type="datetime6">
+              <a:rPr lang="de-DE" smtClean="0"/>
+              <a:pPr/>
+              <a:t>Januar 24</a:t>
+            </a:fld>
+            <a:endParaRPr lang="en-US" dirty="0"/>
+          </a:p>
+        </p:txBody>
+      </p:sp>
+      <p:pic>
+        <p:nvPicPr>
+          <p:cNvPr id="12" name="Content Placeholder 11" descr="A close-up of a document&#10;&#10;Description automatically generated">
+            <a:extLst>
+              <a:ext uri="{FF2B5EF4-FFF2-40B4-BE49-F238E27FC236}">
+                <a16:creationId xmlns:a16="http://schemas.microsoft.com/office/drawing/2014/main" id="{72C5CB1D-FF45-CCB1-8412-8E4456158069}"/>
+              </a:ext>
+            </a:extLst>
+          </p:cNvPr>
+          <p:cNvPicPr>
+            <a:picLocks noGrp="1" noChangeAspect="1"/>
+          </p:cNvPicPr>
+          <p:nvPr>
+            <p:ph sz="half" idx="13"/>
+          </p:nvPr>
+        </p:nvPicPr>
+        <p:blipFill>
+          <a:blip r:embed="rId2"/>
+          <a:stretch>
+            <a:fillRect/>
+          </a:stretch>
+        </p:blipFill>
+        <p:spPr>
+          <a:xfrm>
+            <a:off x="6362942" y="3894282"/>
+            <a:ext cx="4864100" cy="2146300"/>
+          </a:xfrm>
+        </p:spPr>
+      </p:pic>
+      <p:pic>
+        <p:nvPicPr>
+          <p:cNvPr id="14" name="Picture 13" descr="A screenshot of a computer&#10;&#10;Description automatically generated">
+            <a:extLst>
+              <a:ext uri="{FF2B5EF4-FFF2-40B4-BE49-F238E27FC236}">
+                <a16:creationId xmlns:a16="http://schemas.microsoft.com/office/drawing/2014/main" id="{8151340C-F216-4DD2-DBAC-EF4E69957704}"/>
+              </a:ext>
+            </a:extLst>
+          </p:cNvPr>
+          <p:cNvPicPr>
+            <a:picLocks noChangeAspect="1"/>
+          </p:cNvPicPr>
+          <p:nvPr/>
+        </p:nvPicPr>
+        <p:blipFill rotWithShape="1">
+          <a:blip r:embed="rId3"/>
+          <a:srcRect b="38604"/>
+          <a:stretch/>
+        </p:blipFill>
+        <p:spPr>
+          <a:xfrm>
+            <a:off x="964958" y="2196522"/>
+            <a:ext cx="4876800" cy="3844060"/>
+          </a:xfrm>
+          <a:prstGeom prst="rect">
+            <a:avLst/>
+          </a:prstGeom>
+        </p:spPr>
+      </p:pic>
+      <p:pic>
+        <p:nvPicPr>
+          <p:cNvPr id="15" name="Picture 14" descr="A screenshot of a computer&#10;&#10;Description automatically generated">
+            <a:extLst>
+              <a:ext uri="{FF2B5EF4-FFF2-40B4-BE49-F238E27FC236}">
+                <a16:creationId xmlns:a16="http://schemas.microsoft.com/office/drawing/2014/main" id="{5C43B927-C366-C560-E29E-F8E1016526F7}"/>
+              </a:ext>
+            </a:extLst>
+          </p:cNvPr>
+          <p:cNvPicPr>
+            <a:picLocks noChangeAspect="1"/>
+          </p:cNvPicPr>
+          <p:nvPr/>
+        </p:nvPicPr>
+        <p:blipFill rotWithShape="1">
+          <a:blip r:embed="rId3"/>
+          <a:srcRect t="60346"/>
+          <a:stretch/>
+        </p:blipFill>
+        <p:spPr>
+          <a:xfrm>
+            <a:off x="6350242" y="1411505"/>
+            <a:ext cx="4876800" cy="2482777"/>
+          </a:xfrm>
+          <a:prstGeom prst="rect">
+            <a:avLst/>
+          </a:prstGeom>
+        </p:spPr>
+      </p:pic>
+    </p:spTree>
+    <p:extLst>
+      <p:ext uri="{BB962C8B-B14F-4D97-AF65-F5344CB8AC3E}">
+        <p14:creationId xmlns:p14="http://schemas.microsoft.com/office/powerpoint/2010/main" val="1224718208"/>
+      </p:ext>
+    </p:extLst>
+  </p:cSld>
+  <p:clrMapOvr>
+    <a:masterClrMapping/>
+  </p:clrMapOvr>
+</p:sld>
+</file>
+
+<file path=ppt/slides/slide12.xml><?xml version="1.0" encoding="utf-8"?>
+<p:sld xmlns:a="http://schemas.openxmlformats.org/drawingml/2006/main" xmlns:r="http://schemas.openxmlformats.org/officeDocument/2006/relationships" xmlns:p="http://schemas.openxmlformats.org/presentationml/2006/main">
+  <p:cSld>
+    <p:spTree>
+      <p:nvGrpSpPr>
+        <p:cNvPr id="1" name=""/>
+        <p:cNvGrpSpPr/>
+        <p:nvPr/>
+      </p:nvGrpSpPr>
+      <p:grpSpPr>
+        <a:xfrm>
+          <a:off x="0" y="0"/>
+          <a:ext cx="0" cy="0"/>
+          <a:chOff x="0" y="0"/>
+          <a:chExt cx="0" cy="0"/>
+        </a:xfrm>
+      </p:grpSpPr>
+      <p:pic>
+        <p:nvPicPr>
+          <p:cNvPr id="5" name="Content Placeholder 4" descr="A computer screen shot of a black screen&#10;&#10;Description automatically generated">
+            <a:extLst>
+              <a:ext uri="{FF2B5EF4-FFF2-40B4-BE49-F238E27FC236}">
+                <a16:creationId xmlns:a16="http://schemas.microsoft.com/office/drawing/2014/main" id="{8AAAC9D8-F8C1-2FFA-EE93-6533A1329380}"/>
+              </a:ext>
+            </a:extLst>
+          </p:cNvPr>
+          <p:cNvPicPr>
+            <a:picLocks noGrp="1" noChangeAspect="1"/>
+          </p:cNvPicPr>
+          <p:nvPr>
+            <p:ph idx="1"/>
+          </p:nvPr>
+        </p:nvPicPr>
+        <p:blipFill rotWithShape="1">
+          <a:blip r:embed="rId2"/>
+          <a:srcRect b="50000"/>
+          <a:stretch/>
+        </p:blipFill>
+        <p:spPr>
+          <a:xfrm>
+            <a:off x="767408" y="1055686"/>
+            <a:ext cx="5328592" cy="4076085"/>
+          </a:xfrm>
+        </p:spPr>
+      </p:pic>
+      <p:sp>
+        <p:nvSpPr>
+          <p:cNvPr id="3" name="Title 2">
+            <a:extLst>
+              <a:ext uri="{FF2B5EF4-FFF2-40B4-BE49-F238E27FC236}">
+                <a16:creationId xmlns:a16="http://schemas.microsoft.com/office/drawing/2014/main" id="{1BE8922E-C1F9-9003-2A16-901BB8F58836}"/>
+              </a:ext>
+            </a:extLst>
+          </p:cNvPr>
+          <p:cNvSpPr>
+            <a:spLocks noGrp="1"/>
+          </p:cNvSpPr>
+          <p:nvPr>
+            <p:ph type="ctrTitle"/>
+          </p:nvPr>
+        </p:nvSpPr>
+        <p:spPr/>
+        <p:txBody>
+          <a:bodyPr/>
+          <a:lstStyle/>
+          <a:p>
+            <a:r>
+              <a:rPr lang="en-AT" dirty="0"/>
+              <a:t>RDF Generation – One-Shot</a:t>
+            </a:r>
+          </a:p>
+        </p:txBody>
+      </p:sp>
+      <p:pic>
+        <p:nvPicPr>
+          <p:cNvPr id="6" name="Content Placeholder 4" descr="A computer screen shot of a black screen&#10;&#10;Description automatically generated">
+            <a:extLst>
+              <a:ext uri="{FF2B5EF4-FFF2-40B4-BE49-F238E27FC236}">
+                <a16:creationId xmlns:a16="http://schemas.microsoft.com/office/drawing/2014/main" id="{C470A7F9-991E-F088-FC86-BD90DDC4895E}"/>
+              </a:ext>
+            </a:extLst>
+          </p:cNvPr>
+          <p:cNvPicPr>
+            <a:picLocks noChangeAspect="1"/>
+          </p:cNvPicPr>
+          <p:nvPr/>
+        </p:nvPicPr>
+        <p:blipFill rotWithShape="1">
+          <a:blip r:embed="rId2"/>
+          <a:srcRect t="50000"/>
+          <a:stretch/>
+        </p:blipFill>
+        <p:spPr>
+          <a:xfrm>
+            <a:off x="6304777" y="1055687"/>
+            <a:ext cx="5328592" cy="4076083"/>
+          </a:xfrm>
+          <a:prstGeom prst="rect">
+            <a:avLst/>
+          </a:prstGeom>
+        </p:spPr>
+      </p:pic>
+    </p:spTree>
+    <p:extLst>
+      <p:ext uri="{BB962C8B-B14F-4D97-AF65-F5344CB8AC3E}">
+        <p14:creationId xmlns:p14="http://schemas.microsoft.com/office/powerpoint/2010/main" val="1408516455"/>
+      </p:ext>
+    </p:extLst>
+  </p:cSld>
+  <p:clrMapOvr>
+    <a:masterClrMapping/>
+  </p:clrMapOvr>
+</p:sld>
+</file>
+
+<file path=ppt/slides/slide13.xml><?xml version="1.0" encoding="utf-8"?>
+<p:sld xmlns:a="http://schemas.openxmlformats.org/drawingml/2006/main" xmlns:r="http://schemas.openxmlformats.org/officeDocument/2006/relationships" xmlns:p="http://schemas.openxmlformats.org/presentationml/2006/main">
+  <p:cSld>
+    <p:spTree>
+      <p:nvGrpSpPr>
+        <p:cNvPr id="1" name=""/>
+        <p:cNvGrpSpPr/>
+        <p:nvPr/>
+      </p:nvGrpSpPr>
+      <p:grpSpPr>
+        <a:xfrm>
+          <a:off x="0" y="0"/>
+          <a:ext cx="0" cy="0"/>
+          <a:chOff x="0" y="0"/>
+          <a:chExt cx="0" cy="0"/>
+        </a:xfrm>
+      </p:grpSpPr>
+      <p:pic>
+        <p:nvPicPr>
+          <p:cNvPr id="3" name="Grafik 2">
+            <a:extLst>
+              <a:ext uri="{FF2B5EF4-FFF2-40B4-BE49-F238E27FC236}">
+                <a16:creationId xmlns:a16="http://schemas.microsoft.com/office/drawing/2014/main" id="{3711D89E-E6C8-955A-36C2-735A5787F660}"/>
+              </a:ext>
+            </a:extLst>
+          </p:cNvPr>
+          <p:cNvPicPr>
+            <a:picLocks noChangeAspect="1"/>
+          </p:cNvPicPr>
+          <p:nvPr/>
+        </p:nvPicPr>
+        <p:blipFill>
+          <a:blip r:embed="rId2"/>
+          <a:stretch>
+            <a:fillRect/>
+          </a:stretch>
+        </p:blipFill>
+        <p:spPr>
+          <a:xfrm>
+            <a:off x="-1" y="0"/>
+            <a:ext cx="12274475" cy="6904392"/>
+          </a:xfrm>
+          <a:prstGeom prst="rect">
+            <a:avLst/>
+          </a:prstGeom>
+        </p:spPr>
+      </p:pic>
+    </p:spTree>
+    <p:extLst>
+      <p:ext uri="{BB962C8B-B14F-4D97-AF65-F5344CB8AC3E}">
+        <p14:creationId xmlns:p14="http://schemas.microsoft.com/office/powerpoint/2010/main" val="3670960750"/>
+      </p:ext>
+    </p:extLst>
+  </p:cSld>
+  <p:clrMapOvr>
+    <a:masterClrMapping/>
+  </p:clrMapOvr>
+</p:sld>
+</file>
+
 <file path=ppt/slides/slide2.xml><?xml version="1.0" encoding="utf-8"?>
 <p:sld xmlns:a="http://schemas.openxmlformats.org/drawingml/2006/main" xmlns:r="http://schemas.openxmlformats.org/officeDocument/2006/relationships" xmlns:p="http://schemas.openxmlformats.org/presentationml/2006/main">
   <p:cSld>
@@ -7182,40 +7892,202 @@
           <a:chExt cx="0" cy="0"/>
         </a:xfrm>
       </p:grpSpPr>
-      <p:pic>
-        <p:nvPicPr>
-          <p:cNvPr id="3" name="Grafik 2">
-            <a:extLst>
-              <a:ext uri="{FF2B5EF4-FFF2-40B4-BE49-F238E27FC236}">
-                <a16:creationId xmlns:a16="http://schemas.microsoft.com/office/drawing/2014/main" id="{3711D89E-E6C8-955A-36C2-735A5787F660}"/>
-              </a:ext>
-            </a:extLst>
-          </p:cNvPr>
-          <p:cNvPicPr>
-            <a:picLocks noChangeAspect="1"/>
-          </p:cNvPicPr>
+      <p:sp>
+        <p:nvSpPr>
+          <p:cNvPr id="3" name="Content Placeholder 2">
+            <a:extLst>
+              <a:ext uri="{FF2B5EF4-FFF2-40B4-BE49-F238E27FC236}">
+                <a16:creationId xmlns:a16="http://schemas.microsoft.com/office/drawing/2014/main" id="{9E2B5A80-EA62-E05A-81A9-CF9E4119D82E}"/>
+              </a:ext>
+            </a:extLst>
+          </p:cNvPr>
+          <p:cNvSpPr>
+            <a:spLocks noGrp="1"/>
+          </p:cNvSpPr>
+          <p:nvPr>
+            <p:ph idx="1"/>
+          </p:nvPr>
+        </p:nvSpPr>
+        <p:spPr/>
+        <p:txBody>
+          <a:bodyPr/>
+          <a:lstStyle/>
+          <a:p>
+            <a:r>
+              <a:rPr lang="en-AT" dirty="0"/>
+              <a:t>ChatGPT 3.5</a:t>
+            </a:r>
+          </a:p>
+          <a:p>
+            <a:r>
+              <a:rPr lang="en-GB" dirty="0"/>
+              <a:t>Chat Generative Pre-trained Transformer based on a LLM</a:t>
+            </a:r>
+          </a:p>
+          <a:p>
+            <a:r>
+              <a:rPr lang="en-GB" dirty="0"/>
+              <a:t>Developed by </a:t>
+            </a:r>
+            <a:r>
+              <a:rPr lang="en-GB" dirty="0" err="1"/>
+              <a:t>OpenAI</a:t>
+            </a:r>
+            <a:endParaRPr lang="en-GB" dirty="0"/>
+          </a:p>
+          <a:p>
+            <a:r>
+              <a:rPr lang="en-AT" dirty="0"/>
+              <a:t>Free and widely available to everyone</a:t>
+            </a:r>
+          </a:p>
+          <a:p>
+            <a:r>
+              <a:rPr lang="en-AT" dirty="0"/>
+              <a:t>Prompting techniques from the Prompt Engineering Guide</a:t>
+            </a:r>
+            <a:r>
+              <a:rPr lang="en-AT" baseline="30000" dirty="0"/>
+              <a:t>1</a:t>
+            </a:r>
+          </a:p>
+          <a:p>
+            <a:r>
+              <a:rPr lang="en-AT" dirty="0"/>
+              <a:t>RDF Generation</a:t>
+            </a:r>
+          </a:p>
+          <a:p>
+            <a:pPr lvl="1"/>
+            <a:r>
+              <a:rPr lang="en-AT" dirty="0"/>
+              <a:t>Zero-Shot</a:t>
+            </a:r>
+          </a:p>
+          <a:p>
+            <a:pPr lvl="1"/>
+            <a:r>
+              <a:rPr lang="en-AT" dirty="0"/>
+              <a:t>One-Shot</a:t>
+            </a:r>
+          </a:p>
+          <a:p>
+            <a:r>
+              <a:rPr lang="en-AT" dirty="0"/>
+              <a:t>RML Generation</a:t>
+            </a:r>
+          </a:p>
+          <a:p>
+            <a:pPr lvl="1"/>
+            <a:r>
+              <a:rPr lang="en-AT" dirty="0"/>
+              <a:t>Zero-Shot</a:t>
+            </a:r>
+          </a:p>
+          <a:p>
+            <a:pPr lvl="1"/>
+            <a:r>
+              <a:rPr lang="en-AT" dirty="0"/>
+              <a:t>One-Shot</a:t>
+            </a:r>
+          </a:p>
+          <a:p>
+            <a:pPr lvl="1"/>
+            <a:r>
+              <a:rPr lang="en-AT" dirty="0"/>
+              <a:t>Few-Shot</a:t>
+            </a:r>
+          </a:p>
+        </p:txBody>
+      </p:sp>
+      <p:sp>
+        <p:nvSpPr>
+          <p:cNvPr id="8" name="Title 7">
+            <a:extLst>
+              <a:ext uri="{FF2B5EF4-FFF2-40B4-BE49-F238E27FC236}">
+                <a16:creationId xmlns:a16="http://schemas.microsoft.com/office/drawing/2014/main" id="{18ACF4FB-8C8C-04FE-48DD-A703BCD30E88}"/>
+              </a:ext>
+            </a:extLst>
+          </p:cNvPr>
+          <p:cNvSpPr>
+            <a:spLocks noGrp="1"/>
+          </p:cNvSpPr>
+          <p:nvPr>
+            <p:ph type="ctrTitle"/>
+          </p:nvPr>
+        </p:nvSpPr>
+        <p:spPr/>
+        <p:txBody>
+          <a:bodyPr/>
+          <a:lstStyle/>
+          <a:p>
+            <a:r>
+              <a:rPr lang="en-AT" dirty="0"/>
+              <a:t>Prompting</a:t>
+            </a:r>
+          </a:p>
+        </p:txBody>
+      </p:sp>
+      <p:sp>
+        <p:nvSpPr>
+          <p:cNvPr id="2" name="TextBox 1">
+            <a:extLst>
+              <a:ext uri="{FF2B5EF4-FFF2-40B4-BE49-F238E27FC236}">
+                <a16:creationId xmlns:a16="http://schemas.microsoft.com/office/drawing/2014/main" id="{23A0D70F-23BB-C086-6182-54FE1705205D}"/>
+              </a:ext>
+            </a:extLst>
+          </p:cNvPr>
+          <p:cNvSpPr txBox="1"/>
           <p:nvPr/>
-        </p:nvPicPr>
-        <p:blipFill>
-          <a:blip r:embed="rId2"/>
-          <a:stretch>
-            <a:fillRect/>
-          </a:stretch>
-        </p:blipFill>
+        </p:nvSpPr>
         <p:spPr>
           <a:xfrm>
-            <a:off x="-1" y="0"/>
-            <a:ext cx="12274475" cy="6904392"/>
+            <a:off x="1872819" y="6196574"/>
+            <a:ext cx="9760549" cy="307777"/>
           </a:xfrm>
           <a:prstGeom prst="rect">
             <a:avLst/>
           </a:prstGeom>
+          <a:noFill/>
         </p:spPr>
-      </p:pic>
+        <p:txBody>
+          <a:bodyPr wrap="square" rtlCol="0">
+            <a:spAutoFit/>
+          </a:bodyPr>
+          <a:lstStyle/>
+          <a:p>
+            <a:r>
+              <a:rPr lang="en-GB" sz="1400" baseline="30000" dirty="0"/>
+              <a:t>1 </a:t>
+            </a:r>
+            <a:r>
+              <a:rPr lang="en-GB" sz="1400" dirty="0">
+                <a:solidFill>
+                  <a:schemeClr val="accent5"/>
+                </a:solidFill>
+              </a:rPr>
+              <a:t>https://</a:t>
+            </a:r>
+            <a:r>
+              <a:rPr lang="en-GB" sz="1400" dirty="0" err="1">
+                <a:solidFill>
+                  <a:schemeClr val="accent5"/>
+                </a:solidFill>
+              </a:rPr>
+              <a:t>www.promptingguide.ai</a:t>
+            </a:r>
+            <a:endParaRPr lang="en-AT" sz="1400" dirty="0">
+              <a:solidFill>
+                <a:schemeClr val="accent5"/>
+              </a:solidFill>
+            </a:endParaRPr>
+          </a:p>
+        </p:txBody>
+      </p:sp>
     </p:spTree>
     <p:extLst>
       <p:ext uri="{BB962C8B-B14F-4D97-AF65-F5344CB8AC3E}">
-        <p14:creationId xmlns:p14="http://schemas.microsoft.com/office/powerpoint/2010/main" val="3670960750"/>
+        <p14:creationId xmlns:p14="http://schemas.microsoft.com/office/powerpoint/2010/main" val="518809559"/>
       </p:ext>
     </p:extLst>
   </p:cSld>

</xml_diff>

<commit_message>
added basic RML to presi
</commit_message>
<xml_diff>
--- a/Presentation/final.pptx
+++ b/Presentation/final.pptx
@@ -5,10 +5,10 @@
     <p:sldMasterId id="2147483728" r:id="rId2"/>
   </p:sldMasterIdLst>
   <p:notesMasterIdLst>
-    <p:notesMasterId r:id="rId16"/>
+    <p:notesMasterId r:id="rId20"/>
   </p:notesMasterIdLst>
   <p:handoutMasterIdLst>
-    <p:handoutMasterId r:id="rId17"/>
+    <p:handoutMasterId r:id="rId21"/>
   </p:handoutMasterIdLst>
   <p:sldIdLst>
     <p:sldId id="257" r:id="rId3"/>
@@ -23,7 +23,11 @@
     <p:sldId id="283" r:id="rId12"/>
     <p:sldId id="284" r:id="rId13"/>
     <p:sldId id="285" r:id="rId14"/>
-    <p:sldId id="265" r:id="rId15"/>
+    <p:sldId id="286" r:id="rId15"/>
+    <p:sldId id="287" r:id="rId16"/>
+    <p:sldId id="288" r:id="rId17"/>
+    <p:sldId id="289" r:id="rId18"/>
+    <p:sldId id="265" r:id="rId19"/>
   </p:sldIdLst>
   <p:sldSz cx="12192000" cy="6858000"/>
   <p:notesSz cx="6858000" cy="9144000"/>
@@ -5406,6 +5410,773 @@
 </file>
 
 <file path=ppt/slides/slide13.xml><?xml version="1.0" encoding="utf-8"?>
+<p:sld xmlns:a="http://schemas.openxmlformats.org/drawingml/2006/main" xmlns:r="http://schemas.openxmlformats.org/officeDocument/2006/relationships" xmlns:p="http://schemas.openxmlformats.org/presentationml/2006/main">
+  <p:cSld>
+    <p:spTree>
+      <p:nvGrpSpPr>
+        <p:cNvPr id="1" name=""/>
+        <p:cNvGrpSpPr/>
+        <p:nvPr/>
+      </p:nvGrpSpPr>
+      <p:grpSpPr>
+        <a:xfrm>
+          <a:off x="0" y="0"/>
+          <a:ext cx="0" cy="0"/>
+          <a:chOff x="0" y="0"/>
+          <a:chExt cx="0" cy="0"/>
+        </a:xfrm>
+      </p:grpSpPr>
+      <p:sp>
+        <p:nvSpPr>
+          <p:cNvPr id="2" name="Content Placeholder 1">
+            <a:extLst>
+              <a:ext uri="{FF2B5EF4-FFF2-40B4-BE49-F238E27FC236}">
+                <a16:creationId xmlns:a16="http://schemas.microsoft.com/office/drawing/2014/main" id="{A469AA44-F1B3-B0B6-6401-81D029A0D310}"/>
+              </a:ext>
+            </a:extLst>
+          </p:cNvPr>
+          <p:cNvSpPr>
+            <a:spLocks noGrp="1"/>
+          </p:cNvSpPr>
+          <p:nvPr>
+            <p:ph idx="1"/>
+          </p:nvPr>
+        </p:nvSpPr>
+        <p:spPr>
+          <a:xfrm>
+            <a:off x="767409" y="1130142"/>
+            <a:ext cx="5328592" cy="4746783"/>
+          </a:xfrm>
+        </p:spPr>
+        <p:txBody>
+          <a:bodyPr/>
+          <a:lstStyle/>
+          <a:p>
+            <a:r>
+              <a:rPr lang="en-AT" dirty="0"/>
+              <a:t>Now generating RML</a:t>
+            </a:r>
+          </a:p>
+          <a:p>
+            <a:r>
+              <a:rPr lang="en-AT" b="1" u="sng" dirty="0"/>
+              <a:t>R</a:t>
+            </a:r>
+            <a:r>
+              <a:rPr lang="en-AT" dirty="0"/>
+              <a:t>DF </a:t>
+            </a:r>
+            <a:r>
+              <a:rPr lang="en-AT" b="1" u="sng" dirty="0"/>
+              <a:t>M</a:t>
+            </a:r>
+            <a:r>
+              <a:rPr lang="en-AT" dirty="0"/>
+              <a:t>apping </a:t>
+            </a:r>
+            <a:r>
+              <a:rPr lang="en-AT" b="1" u="sng" dirty="0"/>
+              <a:t>L</a:t>
+            </a:r>
+            <a:r>
+              <a:rPr lang="en-AT" dirty="0"/>
+              <a:t>anguage</a:t>
+            </a:r>
+          </a:p>
+          <a:p>
+            <a:r>
+              <a:rPr lang="en-AT" dirty="0"/>
+              <a:t>Used to generate RDF out of structured data (JSON, CSV, XML,…)</a:t>
+            </a:r>
+          </a:p>
+          <a:p>
+            <a:r>
+              <a:rPr lang="en-AT" dirty="0"/>
+              <a:t>Portability - one RML file can be used on a lot of data</a:t>
+            </a:r>
+          </a:p>
+          <a:p>
+            <a:r>
+              <a:rPr lang="en-AT" dirty="0"/>
+              <a:t>Define set of mapping rules</a:t>
+            </a:r>
+          </a:p>
+          <a:p>
+            <a:r>
+              <a:rPr lang="en-GB" dirty="0"/>
+              <a:t>Consists of Logical Source, Subject Map and zero or more Predicate-Object Maps</a:t>
+            </a:r>
+            <a:endParaRPr lang="en-AT" dirty="0"/>
+          </a:p>
+          <a:p>
+            <a:endParaRPr lang="en-AT" dirty="0"/>
+          </a:p>
+        </p:txBody>
+      </p:sp>
+      <p:sp>
+        <p:nvSpPr>
+          <p:cNvPr id="3" name="Title 2">
+            <a:extLst>
+              <a:ext uri="{FF2B5EF4-FFF2-40B4-BE49-F238E27FC236}">
+                <a16:creationId xmlns:a16="http://schemas.microsoft.com/office/drawing/2014/main" id="{65ACBFE8-9BED-C063-0FBB-E361505523E1}"/>
+              </a:ext>
+            </a:extLst>
+          </p:cNvPr>
+          <p:cNvSpPr>
+            <a:spLocks noGrp="1"/>
+          </p:cNvSpPr>
+          <p:nvPr>
+            <p:ph type="ctrTitle"/>
+          </p:nvPr>
+        </p:nvSpPr>
+        <p:spPr/>
+        <p:txBody>
+          <a:bodyPr/>
+          <a:lstStyle/>
+          <a:p>
+            <a:r>
+              <a:rPr lang="en-AT" dirty="0"/>
+              <a:t>RML Generation</a:t>
+            </a:r>
+          </a:p>
+        </p:txBody>
+      </p:sp>
+      <p:sp>
+        <p:nvSpPr>
+          <p:cNvPr id="4" name="Content Placeholder 1">
+            <a:extLst>
+              <a:ext uri="{FF2B5EF4-FFF2-40B4-BE49-F238E27FC236}">
+                <a16:creationId xmlns:a16="http://schemas.microsoft.com/office/drawing/2014/main" id="{B35192CC-FFA8-FB1F-727F-62CBBD129E98}"/>
+              </a:ext>
+            </a:extLst>
+          </p:cNvPr>
+          <p:cNvSpPr txBox="1">
+            <a:spLocks/>
+          </p:cNvSpPr>
+          <p:nvPr/>
+        </p:nvSpPr>
+        <p:spPr>
+          <a:xfrm>
+            <a:off x="6200388" y="1055608"/>
+            <a:ext cx="5328592" cy="4746783"/>
+          </a:xfrm>
+          <a:prstGeom prst="rect">
+            <a:avLst/>
+          </a:prstGeom>
+        </p:spPr>
+        <p:txBody>
+          <a:bodyPr vert="horz" lIns="91440" tIns="45720" rIns="91440" bIns="45720" rtlCol="0">
+            <a:normAutofit/>
+          </a:bodyPr>
+          <a:lstStyle>
+            <a:lvl1pPr marL="228594" indent="-228594" algn="l" defTabSz="914400" rtl="0" eaLnBrk="1" latinLnBrk="0" hangingPunct="1">
+              <a:lnSpc>
+                <a:spcPct val="90000"/>
+              </a:lnSpc>
+              <a:spcBef>
+                <a:spcPts val="1000"/>
+              </a:spcBef>
+              <a:buFont typeface="Wingdings" pitchFamily="2" charset="2"/>
+              <a:buChar char="§"/>
+              <a:defRPr sz="1733" kern="1200">
+                <a:solidFill>
+                  <a:srgbClr val="4C4D4C"/>
+                </a:solidFill>
+                <a:latin typeface="+mn-lt"/>
+                <a:ea typeface="+mn-ea"/>
+                <a:cs typeface="+mn-cs"/>
+              </a:defRPr>
+            </a:lvl1pPr>
+            <a:lvl2pPr marL="685783" indent="-228594" algn="l" defTabSz="914400" rtl="0" eaLnBrk="1" latinLnBrk="0" hangingPunct="1">
+              <a:lnSpc>
+                <a:spcPct val="90000"/>
+              </a:lnSpc>
+              <a:spcBef>
+                <a:spcPts val="500"/>
+              </a:spcBef>
+              <a:buFont typeface="Wingdings" pitchFamily="2" charset="2"/>
+              <a:buChar char="§"/>
+              <a:defRPr sz="1733" kern="1200">
+                <a:solidFill>
+                  <a:srgbClr val="4C4D4C"/>
+                </a:solidFill>
+                <a:latin typeface="+mn-lt"/>
+                <a:ea typeface="+mn-ea"/>
+                <a:cs typeface="+mn-cs"/>
+              </a:defRPr>
+            </a:lvl2pPr>
+            <a:lvl3pPr marL="1142971" indent="-228594" algn="l" defTabSz="914400" rtl="0" eaLnBrk="1" latinLnBrk="0" hangingPunct="1">
+              <a:lnSpc>
+                <a:spcPct val="90000"/>
+              </a:lnSpc>
+              <a:spcBef>
+                <a:spcPts val="500"/>
+              </a:spcBef>
+              <a:buFont typeface="Wingdings" pitchFamily="2" charset="2"/>
+              <a:buChar char="§"/>
+              <a:defRPr sz="1733" kern="1200">
+                <a:solidFill>
+                  <a:srgbClr val="4C4D4C"/>
+                </a:solidFill>
+                <a:latin typeface="+mn-lt"/>
+                <a:ea typeface="+mn-ea"/>
+                <a:cs typeface="+mn-cs"/>
+              </a:defRPr>
+            </a:lvl3pPr>
+            <a:lvl4pPr marL="1600160" indent="-228594" algn="l" defTabSz="914400" rtl="0" eaLnBrk="1" latinLnBrk="0" hangingPunct="1">
+              <a:lnSpc>
+                <a:spcPct val="90000"/>
+              </a:lnSpc>
+              <a:spcBef>
+                <a:spcPts val="500"/>
+              </a:spcBef>
+              <a:buFont typeface="Wingdings" pitchFamily="2" charset="2"/>
+              <a:buChar char="§"/>
+              <a:defRPr sz="1733" kern="1200">
+                <a:solidFill>
+                  <a:srgbClr val="4C4D4C"/>
+                </a:solidFill>
+                <a:latin typeface="+mn-lt"/>
+                <a:ea typeface="+mn-ea"/>
+                <a:cs typeface="+mn-cs"/>
+              </a:defRPr>
+            </a:lvl4pPr>
+            <a:lvl5pPr marL="2057349" indent="-228594" algn="l" defTabSz="914400" rtl="0" eaLnBrk="1" latinLnBrk="0" hangingPunct="1">
+              <a:lnSpc>
+                <a:spcPct val="90000"/>
+              </a:lnSpc>
+              <a:spcBef>
+                <a:spcPts val="500"/>
+              </a:spcBef>
+              <a:buFont typeface="Wingdings" pitchFamily="2" charset="2"/>
+              <a:buChar char="§"/>
+              <a:defRPr sz="1733" kern="1200">
+                <a:solidFill>
+                  <a:srgbClr val="4C4D4C"/>
+                </a:solidFill>
+                <a:latin typeface="+mn-lt"/>
+                <a:ea typeface="+mn-ea"/>
+                <a:cs typeface="+mn-cs"/>
+              </a:defRPr>
+            </a:lvl5pPr>
+            <a:lvl6pPr marL="2514600" indent="-228600" algn="l" defTabSz="914400" rtl="0" eaLnBrk="1" latinLnBrk="0" hangingPunct="1">
+              <a:lnSpc>
+                <a:spcPct val="90000"/>
+              </a:lnSpc>
+              <a:spcBef>
+                <a:spcPts val="500"/>
+              </a:spcBef>
+              <a:buFont typeface="Arial" panose="020B0604020202020204" pitchFamily="34" charset="0"/>
+              <a:buChar char="•"/>
+              <a:defRPr sz="2000" kern="1200">
+                <a:solidFill>
+                  <a:schemeClr val="tx1"/>
+                </a:solidFill>
+                <a:latin typeface="+mn-lt"/>
+                <a:ea typeface="+mn-ea"/>
+                <a:cs typeface="+mn-cs"/>
+              </a:defRPr>
+            </a:lvl6pPr>
+            <a:lvl7pPr marL="2971800" indent="-228600" algn="l" defTabSz="914400" rtl="0" eaLnBrk="1" latinLnBrk="0" hangingPunct="1">
+              <a:lnSpc>
+                <a:spcPct val="90000"/>
+              </a:lnSpc>
+              <a:spcBef>
+                <a:spcPts val="500"/>
+              </a:spcBef>
+              <a:buFont typeface="Arial" panose="020B0604020202020204" pitchFamily="34" charset="0"/>
+              <a:buChar char="•"/>
+              <a:defRPr sz="2000" kern="1200">
+                <a:solidFill>
+                  <a:schemeClr val="tx1"/>
+                </a:solidFill>
+                <a:latin typeface="+mn-lt"/>
+                <a:ea typeface="+mn-ea"/>
+                <a:cs typeface="+mn-cs"/>
+              </a:defRPr>
+            </a:lvl7pPr>
+            <a:lvl8pPr marL="3429000" indent="-228600" algn="l" defTabSz="914400" rtl="0" eaLnBrk="1" latinLnBrk="0" hangingPunct="1">
+              <a:lnSpc>
+                <a:spcPct val="90000"/>
+              </a:lnSpc>
+              <a:spcBef>
+                <a:spcPts val="500"/>
+              </a:spcBef>
+              <a:buFont typeface="Arial" panose="020B0604020202020204" pitchFamily="34" charset="0"/>
+              <a:buChar char="•"/>
+              <a:defRPr sz="2000" kern="1200">
+                <a:solidFill>
+                  <a:schemeClr val="tx1"/>
+                </a:solidFill>
+                <a:latin typeface="+mn-lt"/>
+                <a:ea typeface="+mn-ea"/>
+                <a:cs typeface="+mn-cs"/>
+              </a:defRPr>
+            </a:lvl8pPr>
+            <a:lvl9pPr marL="3886200" indent="-228600" algn="l" defTabSz="914400" rtl="0" eaLnBrk="1" latinLnBrk="0" hangingPunct="1">
+              <a:lnSpc>
+                <a:spcPct val="90000"/>
+              </a:lnSpc>
+              <a:spcBef>
+                <a:spcPts val="500"/>
+              </a:spcBef>
+              <a:buFont typeface="Arial" panose="020B0604020202020204" pitchFamily="34" charset="0"/>
+              <a:buChar char="•"/>
+              <a:defRPr sz="2000" kern="1200">
+                <a:solidFill>
+                  <a:schemeClr val="tx1"/>
+                </a:solidFill>
+                <a:latin typeface="+mn-lt"/>
+                <a:ea typeface="+mn-ea"/>
+                <a:cs typeface="+mn-cs"/>
+              </a:defRPr>
+            </a:lvl9pPr>
+          </a:lstStyle>
+          <a:p>
+            <a:endParaRPr lang="en-AT" dirty="0"/>
+          </a:p>
+        </p:txBody>
+      </p:sp>
+      <p:pic>
+        <p:nvPicPr>
+          <p:cNvPr id="6" name="Picture 5" descr="A blue screen with black text&#10;&#10;Description automatically generated">
+            <a:extLst>
+              <a:ext uri="{FF2B5EF4-FFF2-40B4-BE49-F238E27FC236}">
+                <a16:creationId xmlns:a16="http://schemas.microsoft.com/office/drawing/2014/main" id="{F8AE668A-2DFD-1E0E-B3B0-E2BB09CC187D}"/>
+              </a:ext>
+            </a:extLst>
+          </p:cNvPr>
+          <p:cNvPicPr>
+            <a:picLocks noChangeAspect="1"/>
+          </p:cNvPicPr>
+          <p:nvPr/>
+        </p:nvPicPr>
+        <p:blipFill>
+          <a:blip r:embed="rId2"/>
+          <a:stretch>
+            <a:fillRect/>
+          </a:stretch>
+        </p:blipFill>
+        <p:spPr>
+          <a:xfrm>
+            <a:off x="6200388" y="1047770"/>
+            <a:ext cx="5536124" cy="1272277"/>
+          </a:xfrm>
+          <a:prstGeom prst="rect">
+            <a:avLst/>
+          </a:prstGeom>
+        </p:spPr>
+      </p:pic>
+      <p:pic>
+        <p:nvPicPr>
+          <p:cNvPr id="8" name="Picture 7" descr="A blue background with black text&#10;&#10;Description automatically generated">
+            <a:extLst>
+              <a:ext uri="{FF2B5EF4-FFF2-40B4-BE49-F238E27FC236}">
+                <a16:creationId xmlns:a16="http://schemas.microsoft.com/office/drawing/2014/main" id="{B866D481-80DF-8661-F3F2-90F1D39D9D0B}"/>
+              </a:ext>
+            </a:extLst>
+          </p:cNvPr>
+          <p:cNvPicPr>
+            <a:picLocks noChangeAspect="1"/>
+          </p:cNvPicPr>
+          <p:nvPr/>
+        </p:nvPicPr>
+        <p:blipFill>
+          <a:blip r:embed="rId3"/>
+          <a:stretch>
+            <a:fillRect/>
+          </a:stretch>
+        </p:blipFill>
+        <p:spPr>
+          <a:xfrm>
+            <a:off x="6200388" y="2423409"/>
+            <a:ext cx="5536125" cy="1050152"/>
+          </a:xfrm>
+          <a:prstGeom prst="rect">
+            <a:avLst/>
+          </a:prstGeom>
+        </p:spPr>
+      </p:pic>
+      <p:pic>
+        <p:nvPicPr>
+          <p:cNvPr id="10" name="Picture 9" descr="A blue background with black text&#10;&#10;Description automatically generated">
+            <a:extLst>
+              <a:ext uri="{FF2B5EF4-FFF2-40B4-BE49-F238E27FC236}">
+                <a16:creationId xmlns:a16="http://schemas.microsoft.com/office/drawing/2014/main" id="{64FE6460-EC3E-A0EE-817C-E7C69BDC678A}"/>
+              </a:ext>
+            </a:extLst>
+          </p:cNvPr>
+          <p:cNvPicPr>
+            <a:picLocks noChangeAspect="1"/>
+          </p:cNvPicPr>
+          <p:nvPr/>
+        </p:nvPicPr>
+        <p:blipFill>
+          <a:blip r:embed="rId4"/>
+          <a:stretch>
+            <a:fillRect/>
+          </a:stretch>
+        </p:blipFill>
+        <p:spPr>
+          <a:xfrm>
+            <a:off x="6200389" y="3576923"/>
+            <a:ext cx="5536123" cy="1035210"/>
+          </a:xfrm>
+          <a:prstGeom prst="rect">
+            <a:avLst/>
+          </a:prstGeom>
+        </p:spPr>
+      </p:pic>
+    </p:spTree>
+    <p:extLst>
+      <p:ext uri="{BB962C8B-B14F-4D97-AF65-F5344CB8AC3E}">
+        <p14:creationId xmlns:p14="http://schemas.microsoft.com/office/powerpoint/2010/main" val="3141240016"/>
+      </p:ext>
+    </p:extLst>
+  </p:cSld>
+  <p:clrMapOvr>
+    <a:masterClrMapping/>
+  </p:clrMapOvr>
+</p:sld>
+</file>
+
+<file path=ppt/slides/slide14.xml><?xml version="1.0" encoding="utf-8"?>
+<p:sld xmlns:a="http://schemas.openxmlformats.org/drawingml/2006/main" xmlns:r="http://schemas.openxmlformats.org/officeDocument/2006/relationships" xmlns:p="http://schemas.openxmlformats.org/presentationml/2006/main">
+  <p:cSld>
+    <p:spTree>
+      <p:nvGrpSpPr>
+        <p:cNvPr id="1" name=""/>
+        <p:cNvGrpSpPr/>
+        <p:nvPr/>
+      </p:nvGrpSpPr>
+      <p:grpSpPr>
+        <a:xfrm>
+          <a:off x="0" y="0"/>
+          <a:ext cx="0" cy="0"/>
+          <a:chOff x="0" y="0"/>
+          <a:chExt cx="0" cy="0"/>
+        </a:xfrm>
+      </p:grpSpPr>
+      <p:sp>
+        <p:nvSpPr>
+          <p:cNvPr id="4" name="Content Placeholder 3">
+            <a:extLst>
+              <a:ext uri="{FF2B5EF4-FFF2-40B4-BE49-F238E27FC236}">
+                <a16:creationId xmlns:a16="http://schemas.microsoft.com/office/drawing/2014/main" id="{CD417FF7-7245-C931-B2CF-204B6472C295}"/>
+              </a:ext>
+            </a:extLst>
+          </p:cNvPr>
+          <p:cNvSpPr>
+            <a:spLocks noGrp="1"/>
+          </p:cNvSpPr>
+          <p:nvPr>
+            <p:ph sz="half" idx="1"/>
+          </p:nvPr>
+        </p:nvSpPr>
+        <p:spPr/>
+        <p:txBody>
+          <a:bodyPr/>
+          <a:lstStyle/>
+          <a:p>
+            <a:endParaRPr lang="en-AT" dirty="0"/>
+          </a:p>
+        </p:txBody>
+      </p:sp>
+      <p:sp>
+        <p:nvSpPr>
+          <p:cNvPr id="5" name="Content Placeholder 4">
+            <a:extLst>
+              <a:ext uri="{FF2B5EF4-FFF2-40B4-BE49-F238E27FC236}">
+                <a16:creationId xmlns:a16="http://schemas.microsoft.com/office/drawing/2014/main" id="{0973C85F-FA7F-4E60-485A-F04E2D29ED66}"/>
+              </a:ext>
+            </a:extLst>
+          </p:cNvPr>
+          <p:cNvSpPr>
+            <a:spLocks noGrp="1"/>
+          </p:cNvSpPr>
+          <p:nvPr>
+            <p:ph sz="half" idx="13"/>
+          </p:nvPr>
+        </p:nvSpPr>
+        <p:spPr/>
+        <p:txBody>
+          <a:bodyPr/>
+          <a:lstStyle/>
+          <a:p>
+            <a:endParaRPr lang="en-AT"/>
+          </a:p>
+        </p:txBody>
+      </p:sp>
+      <p:sp>
+        <p:nvSpPr>
+          <p:cNvPr id="3" name="Title 2">
+            <a:extLst>
+              <a:ext uri="{FF2B5EF4-FFF2-40B4-BE49-F238E27FC236}">
+                <a16:creationId xmlns:a16="http://schemas.microsoft.com/office/drawing/2014/main" id="{31B33511-7BD8-EB72-1039-625EB65C1FB9}"/>
+              </a:ext>
+            </a:extLst>
+          </p:cNvPr>
+          <p:cNvSpPr>
+            <a:spLocks noGrp="1"/>
+          </p:cNvSpPr>
+          <p:nvPr>
+            <p:ph type="ctrTitle"/>
+          </p:nvPr>
+        </p:nvSpPr>
+        <p:spPr/>
+        <p:txBody>
+          <a:bodyPr/>
+          <a:lstStyle/>
+          <a:p>
+            <a:r>
+              <a:rPr lang="en-AT" dirty="0"/>
+              <a:t>RML – Zero-Shot</a:t>
+            </a:r>
+          </a:p>
+        </p:txBody>
+      </p:sp>
+    </p:spTree>
+    <p:extLst>
+      <p:ext uri="{BB962C8B-B14F-4D97-AF65-F5344CB8AC3E}">
+        <p14:creationId xmlns:p14="http://schemas.microsoft.com/office/powerpoint/2010/main" val="273740364"/>
+      </p:ext>
+    </p:extLst>
+  </p:cSld>
+  <p:clrMapOvr>
+    <a:masterClrMapping/>
+  </p:clrMapOvr>
+</p:sld>
+</file>
+
+<file path=ppt/slides/slide15.xml><?xml version="1.0" encoding="utf-8"?>
+<p:sld xmlns:a="http://schemas.openxmlformats.org/drawingml/2006/main" xmlns:r="http://schemas.openxmlformats.org/officeDocument/2006/relationships" xmlns:p="http://schemas.openxmlformats.org/presentationml/2006/main">
+  <p:cSld>
+    <p:spTree>
+      <p:nvGrpSpPr>
+        <p:cNvPr id="1" name="">
+          <a:extLst>
+            <a:ext uri="{FF2B5EF4-FFF2-40B4-BE49-F238E27FC236}">
+              <a16:creationId xmlns:a16="http://schemas.microsoft.com/office/drawing/2014/main" id="{F2998A68-11CF-0732-D0DE-1CACF0A2EE21}"/>
+            </a:ext>
+          </a:extLst>
+        </p:cNvPr>
+        <p:cNvGrpSpPr/>
+        <p:nvPr/>
+      </p:nvGrpSpPr>
+      <p:grpSpPr>
+        <a:xfrm>
+          <a:off x="0" y="0"/>
+          <a:ext cx="0" cy="0"/>
+          <a:chOff x="0" y="0"/>
+          <a:chExt cx="0" cy="0"/>
+        </a:xfrm>
+      </p:grpSpPr>
+      <p:sp>
+        <p:nvSpPr>
+          <p:cNvPr id="4" name="Content Placeholder 3">
+            <a:extLst>
+              <a:ext uri="{FF2B5EF4-FFF2-40B4-BE49-F238E27FC236}">
+                <a16:creationId xmlns:a16="http://schemas.microsoft.com/office/drawing/2014/main" id="{BA36A14D-60A0-122D-358A-5E65CA967009}"/>
+              </a:ext>
+            </a:extLst>
+          </p:cNvPr>
+          <p:cNvSpPr>
+            <a:spLocks noGrp="1"/>
+          </p:cNvSpPr>
+          <p:nvPr>
+            <p:ph sz="half" idx="1"/>
+          </p:nvPr>
+        </p:nvSpPr>
+        <p:spPr/>
+        <p:txBody>
+          <a:bodyPr/>
+          <a:lstStyle/>
+          <a:p>
+            <a:endParaRPr lang="en-AT" dirty="0"/>
+          </a:p>
+        </p:txBody>
+      </p:sp>
+      <p:sp>
+        <p:nvSpPr>
+          <p:cNvPr id="5" name="Content Placeholder 4">
+            <a:extLst>
+              <a:ext uri="{FF2B5EF4-FFF2-40B4-BE49-F238E27FC236}">
+                <a16:creationId xmlns:a16="http://schemas.microsoft.com/office/drawing/2014/main" id="{F44C7D32-8DC8-9538-25AA-7B02AAED91B8}"/>
+              </a:ext>
+            </a:extLst>
+          </p:cNvPr>
+          <p:cNvSpPr>
+            <a:spLocks noGrp="1"/>
+          </p:cNvSpPr>
+          <p:nvPr>
+            <p:ph sz="half" idx="13"/>
+          </p:nvPr>
+        </p:nvSpPr>
+        <p:spPr/>
+        <p:txBody>
+          <a:bodyPr/>
+          <a:lstStyle/>
+          <a:p>
+            <a:endParaRPr lang="en-AT"/>
+          </a:p>
+        </p:txBody>
+      </p:sp>
+      <p:sp>
+        <p:nvSpPr>
+          <p:cNvPr id="3" name="Title 2">
+            <a:extLst>
+              <a:ext uri="{FF2B5EF4-FFF2-40B4-BE49-F238E27FC236}">
+                <a16:creationId xmlns:a16="http://schemas.microsoft.com/office/drawing/2014/main" id="{DE239DB9-4B56-E231-8C38-EAC4CAE9E1CA}"/>
+              </a:ext>
+            </a:extLst>
+          </p:cNvPr>
+          <p:cNvSpPr>
+            <a:spLocks noGrp="1"/>
+          </p:cNvSpPr>
+          <p:nvPr>
+            <p:ph type="ctrTitle"/>
+          </p:nvPr>
+        </p:nvSpPr>
+        <p:spPr/>
+        <p:txBody>
+          <a:bodyPr/>
+          <a:lstStyle/>
+          <a:p>
+            <a:r>
+              <a:rPr lang="en-AT" dirty="0"/>
+              <a:t>RML – One-Shot</a:t>
+            </a:r>
+          </a:p>
+        </p:txBody>
+      </p:sp>
+    </p:spTree>
+    <p:extLst>
+      <p:ext uri="{BB962C8B-B14F-4D97-AF65-F5344CB8AC3E}">
+        <p14:creationId xmlns:p14="http://schemas.microsoft.com/office/powerpoint/2010/main" val="3667923766"/>
+      </p:ext>
+    </p:extLst>
+  </p:cSld>
+  <p:clrMapOvr>
+    <a:masterClrMapping/>
+  </p:clrMapOvr>
+</p:sld>
+</file>
+
+<file path=ppt/slides/slide16.xml><?xml version="1.0" encoding="utf-8"?>
+<p:sld xmlns:a="http://schemas.openxmlformats.org/drawingml/2006/main" xmlns:r="http://schemas.openxmlformats.org/officeDocument/2006/relationships" xmlns:p="http://schemas.openxmlformats.org/presentationml/2006/main">
+  <p:cSld>
+    <p:spTree>
+      <p:nvGrpSpPr>
+        <p:cNvPr id="1" name="">
+          <a:extLst>
+            <a:ext uri="{FF2B5EF4-FFF2-40B4-BE49-F238E27FC236}">
+              <a16:creationId xmlns:a16="http://schemas.microsoft.com/office/drawing/2014/main" id="{3C4DFBBF-DE6C-8DBD-E066-BB3D87D1562C}"/>
+            </a:ext>
+          </a:extLst>
+        </p:cNvPr>
+        <p:cNvGrpSpPr/>
+        <p:nvPr/>
+      </p:nvGrpSpPr>
+      <p:grpSpPr>
+        <a:xfrm>
+          <a:off x="0" y="0"/>
+          <a:ext cx="0" cy="0"/>
+          <a:chOff x="0" y="0"/>
+          <a:chExt cx="0" cy="0"/>
+        </a:xfrm>
+      </p:grpSpPr>
+      <p:sp>
+        <p:nvSpPr>
+          <p:cNvPr id="4" name="Content Placeholder 3">
+            <a:extLst>
+              <a:ext uri="{FF2B5EF4-FFF2-40B4-BE49-F238E27FC236}">
+                <a16:creationId xmlns:a16="http://schemas.microsoft.com/office/drawing/2014/main" id="{79B49B3A-2A5B-CE6A-DCF4-6FCD3E843260}"/>
+              </a:ext>
+            </a:extLst>
+          </p:cNvPr>
+          <p:cNvSpPr>
+            <a:spLocks noGrp="1"/>
+          </p:cNvSpPr>
+          <p:nvPr>
+            <p:ph sz="half" idx="1"/>
+          </p:nvPr>
+        </p:nvSpPr>
+        <p:spPr/>
+        <p:txBody>
+          <a:bodyPr/>
+          <a:lstStyle/>
+          <a:p>
+            <a:endParaRPr lang="en-AT" dirty="0"/>
+          </a:p>
+        </p:txBody>
+      </p:sp>
+      <p:sp>
+        <p:nvSpPr>
+          <p:cNvPr id="5" name="Content Placeholder 4">
+            <a:extLst>
+              <a:ext uri="{FF2B5EF4-FFF2-40B4-BE49-F238E27FC236}">
+                <a16:creationId xmlns:a16="http://schemas.microsoft.com/office/drawing/2014/main" id="{5AA1137F-EC8B-73F0-26CD-1F2E69BCB1D2}"/>
+              </a:ext>
+            </a:extLst>
+          </p:cNvPr>
+          <p:cNvSpPr>
+            <a:spLocks noGrp="1"/>
+          </p:cNvSpPr>
+          <p:nvPr>
+            <p:ph sz="half" idx="13"/>
+          </p:nvPr>
+        </p:nvSpPr>
+        <p:spPr/>
+        <p:txBody>
+          <a:bodyPr/>
+          <a:lstStyle/>
+          <a:p>
+            <a:endParaRPr lang="en-AT"/>
+          </a:p>
+        </p:txBody>
+      </p:sp>
+      <p:sp>
+        <p:nvSpPr>
+          <p:cNvPr id="3" name="Title 2">
+            <a:extLst>
+              <a:ext uri="{FF2B5EF4-FFF2-40B4-BE49-F238E27FC236}">
+                <a16:creationId xmlns:a16="http://schemas.microsoft.com/office/drawing/2014/main" id="{02D3C5AA-D57F-0BD1-DAA7-B255826F0690}"/>
+              </a:ext>
+            </a:extLst>
+          </p:cNvPr>
+          <p:cNvSpPr>
+            <a:spLocks noGrp="1"/>
+          </p:cNvSpPr>
+          <p:nvPr>
+            <p:ph type="ctrTitle"/>
+          </p:nvPr>
+        </p:nvSpPr>
+        <p:spPr/>
+        <p:txBody>
+          <a:bodyPr/>
+          <a:lstStyle/>
+          <a:p>
+            <a:r>
+              <a:rPr lang="en-AT" dirty="0"/>
+              <a:t>RML – Few-Shot</a:t>
+            </a:r>
+          </a:p>
+        </p:txBody>
+      </p:sp>
+    </p:spTree>
+    <p:extLst>
+      <p:ext uri="{BB962C8B-B14F-4D97-AF65-F5344CB8AC3E}">
+        <p14:creationId xmlns:p14="http://schemas.microsoft.com/office/powerpoint/2010/main" val="1975731055"/>
+      </p:ext>
+    </p:extLst>
+  </p:cSld>
+  <p:clrMapOvr>
+    <a:masterClrMapping/>
+  </p:clrMapOvr>
+</p:sld>
+</file>
+
+<file path=ppt/slides/slide17.xml><?xml version="1.0" encoding="utf-8"?>
 <p:sld xmlns:a="http://schemas.openxmlformats.org/drawingml/2006/main" xmlns:r="http://schemas.openxmlformats.org/officeDocument/2006/relationships" xmlns:p="http://schemas.openxmlformats.org/presentationml/2006/main">
   <p:cSld>
     <p:spTree>

</xml_diff>

<commit_message>
add zero-shot and one-shot RML
</commit_message>
<xml_diff>
--- a/Presentation/final.pptx
+++ b/Presentation/final.pptx
@@ -5,10 +5,10 @@
     <p:sldMasterId id="2147483728" r:id="rId2"/>
   </p:sldMasterIdLst>
   <p:notesMasterIdLst>
-    <p:notesMasterId r:id="rId20"/>
+    <p:notesMasterId r:id="rId24"/>
   </p:notesMasterIdLst>
   <p:handoutMasterIdLst>
-    <p:handoutMasterId r:id="rId21"/>
+    <p:handoutMasterId r:id="rId25"/>
   </p:handoutMasterIdLst>
   <p:sldIdLst>
     <p:sldId id="257" r:id="rId3"/>
@@ -25,9 +25,13 @@
     <p:sldId id="285" r:id="rId14"/>
     <p:sldId id="286" r:id="rId15"/>
     <p:sldId id="287" r:id="rId16"/>
-    <p:sldId id="288" r:id="rId17"/>
-    <p:sldId id="289" r:id="rId18"/>
-    <p:sldId id="265" r:id="rId19"/>
+    <p:sldId id="290" r:id="rId17"/>
+    <p:sldId id="291" r:id="rId18"/>
+    <p:sldId id="292" r:id="rId19"/>
+    <p:sldId id="288" r:id="rId20"/>
+    <p:sldId id="293" r:id="rId21"/>
+    <p:sldId id="289" r:id="rId22"/>
+    <p:sldId id="265" r:id="rId23"/>
   </p:sldIdLst>
   <p:sldSz cx="12192000" cy="6858000"/>
   <p:notesSz cx="6858000" cy="9144000"/>
@@ -137,6 +141,382 @@
 </p:presentation>
 </file>
 
+<file path=ppt/revisionInfo.xml><?xml version="1.0" encoding="utf-8"?>
+<p1510:revInfo xmlns:a="http://schemas.openxmlformats.org/drawingml/2006/main" xmlns:r="http://schemas.openxmlformats.org/officeDocument/2006/relationships" xmlns:p1510="http://schemas.microsoft.com/office/powerpoint/2015/10/main">
+  <p1510:revLst>
+    <p1510:client id="{AC3B7B92-2650-D341-8179-AF296BB068D9}" v="9" dt="2024-01-26T09:58:44.556"/>
+  </p1510:revLst>
+</p1510:revInfo>
+</file>
+
+<file path=ppt/changesInfos/changesInfo1.xml><?xml version="1.0" encoding="utf-8"?>
+<pc:chgInfo xmlns:a="http://schemas.openxmlformats.org/drawingml/2006/main" xmlns:r="http://schemas.openxmlformats.org/officeDocument/2006/relationships" xmlns:ac="http://schemas.microsoft.com/office/drawing/2013/main/command" xmlns:pc="http://schemas.microsoft.com/office/powerpoint/2013/main/command">
+  <pc:docChgLst>
+    <pc:chgData name="Joey Hieronimy" userId="fd3028d6-393c-4fce-a437-fa424271b488" providerId="ADAL" clId="{AC3B7B92-2650-D341-8179-AF296BB068D9}"/>
+    <pc:docChg chg="undo custSel addSld modSld">
+      <pc:chgData name="Joey Hieronimy" userId="fd3028d6-393c-4fce-a437-fa424271b488" providerId="ADAL" clId="{AC3B7B92-2650-D341-8179-AF296BB068D9}" dt="2024-01-26T09:58:59.331" v="580" actId="1076"/>
+      <pc:docMkLst>
+        <pc:docMk/>
+      </pc:docMkLst>
+      <pc:sldChg chg="addSp delSp modSp mod">
+        <pc:chgData name="Joey Hieronimy" userId="fd3028d6-393c-4fce-a437-fa424271b488" providerId="ADAL" clId="{AC3B7B92-2650-D341-8179-AF296BB068D9}" dt="2024-01-26T09:39:55.415" v="50" actId="1076"/>
+        <pc:sldMkLst>
+          <pc:docMk/>
+          <pc:sldMk cId="273740364" sldId="287"/>
+        </pc:sldMkLst>
+        <pc:spChg chg="mod">
+          <ac:chgData name="Joey Hieronimy" userId="fd3028d6-393c-4fce-a437-fa424271b488" providerId="ADAL" clId="{AC3B7B92-2650-D341-8179-AF296BB068D9}" dt="2024-01-26T09:38:55.213" v="39" actId="20577"/>
+          <ac:spMkLst>
+            <pc:docMk/>
+            <pc:sldMk cId="273740364" sldId="287"/>
+            <ac:spMk id="4" creationId="{CD417FF7-7245-C931-B2CF-204B6472C295}"/>
+          </ac:spMkLst>
+        </pc:spChg>
+        <pc:spChg chg="del">
+          <ac:chgData name="Joey Hieronimy" userId="fd3028d6-393c-4fce-a437-fa424271b488" providerId="ADAL" clId="{AC3B7B92-2650-D341-8179-AF296BB068D9}" dt="2024-01-26T09:39:37.066" v="40"/>
+          <ac:spMkLst>
+            <pc:docMk/>
+            <pc:sldMk cId="273740364" sldId="287"/>
+            <ac:spMk id="5" creationId="{0973C85F-FA7F-4E60-485A-F04E2D29ED66}"/>
+          </ac:spMkLst>
+        </pc:spChg>
+        <pc:picChg chg="add mod">
+          <ac:chgData name="Joey Hieronimy" userId="fd3028d6-393c-4fce-a437-fa424271b488" providerId="ADAL" clId="{AC3B7B92-2650-D341-8179-AF296BB068D9}" dt="2024-01-26T09:39:50.082" v="49" actId="1076"/>
+          <ac:picMkLst>
+            <pc:docMk/>
+            <pc:sldMk cId="273740364" sldId="287"/>
+            <ac:picMk id="6" creationId="{29148A47-DA1A-84F3-30D8-4C5100FD90DD}"/>
+          </ac:picMkLst>
+        </pc:picChg>
+        <pc:picChg chg="add mod">
+          <ac:chgData name="Joey Hieronimy" userId="fd3028d6-393c-4fce-a437-fa424271b488" providerId="ADAL" clId="{AC3B7B92-2650-D341-8179-AF296BB068D9}" dt="2024-01-26T09:39:55.415" v="50" actId="1076"/>
+          <ac:picMkLst>
+            <pc:docMk/>
+            <pc:sldMk cId="273740364" sldId="287"/>
+            <ac:picMk id="8" creationId="{EE91B31A-40FC-0DBA-2617-FA19612D3AC1}"/>
+          </ac:picMkLst>
+        </pc:picChg>
+      </pc:sldChg>
+      <pc:sldChg chg="addSp delSp modSp mod">
+        <pc:chgData name="Joey Hieronimy" userId="fd3028d6-393c-4fce-a437-fa424271b488" providerId="ADAL" clId="{AC3B7B92-2650-D341-8179-AF296BB068D9}" dt="2024-01-26T09:56:20.259" v="569" actId="1076"/>
+        <pc:sldMkLst>
+          <pc:docMk/>
+          <pc:sldMk cId="3667923766" sldId="288"/>
+        </pc:sldMkLst>
+        <pc:spChg chg="mod">
+          <ac:chgData name="Joey Hieronimy" userId="fd3028d6-393c-4fce-a437-fa424271b488" providerId="ADAL" clId="{AC3B7B92-2650-D341-8179-AF296BB068D9}" dt="2024-01-26T09:55:08.500" v="557" actId="20577"/>
+          <ac:spMkLst>
+            <pc:docMk/>
+            <pc:sldMk cId="3667923766" sldId="288"/>
+            <ac:spMk id="4" creationId="{BA36A14D-60A0-122D-358A-5E65CA967009}"/>
+          </ac:spMkLst>
+        </pc:spChg>
+        <pc:spChg chg="del">
+          <ac:chgData name="Joey Hieronimy" userId="fd3028d6-393c-4fce-a437-fa424271b488" providerId="ADAL" clId="{AC3B7B92-2650-D341-8179-AF296BB068D9}" dt="2024-01-26T09:56:01.185" v="558"/>
+          <ac:spMkLst>
+            <pc:docMk/>
+            <pc:sldMk cId="3667923766" sldId="288"/>
+            <ac:spMk id="5" creationId="{F44C7D32-8DC8-9538-25AA-7B02AAED91B8}"/>
+          </ac:spMkLst>
+        </pc:spChg>
+        <pc:picChg chg="add mod">
+          <ac:chgData name="Joey Hieronimy" userId="fd3028d6-393c-4fce-a437-fa424271b488" providerId="ADAL" clId="{AC3B7B92-2650-D341-8179-AF296BB068D9}" dt="2024-01-26T09:56:20.259" v="569" actId="1076"/>
+          <ac:picMkLst>
+            <pc:docMk/>
+            <pc:sldMk cId="3667923766" sldId="288"/>
+            <ac:picMk id="6" creationId="{C44270C7-C2C0-7AF6-10D0-859FE8778B2F}"/>
+          </ac:picMkLst>
+        </pc:picChg>
+        <pc:picChg chg="add mod">
+          <ac:chgData name="Joey Hieronimy" userId="fd3028d6-393c-4fce-a437-fa424271b488" providerId="ADAL" clId="{AC3B7B92-2650-D341-8179-AF296BB068D9}" dt="2024-01-26T09:56:13.329" v="567" actId="1076"/>
+          <ac:picMkLst>
+            <pc:docMk/>
+            <pc:sldMk cId="3667923766" sldId="288"/>
+            <ac:picMk id="8" creationId="{49D17BA2-530A-ADDB-09C2-DD442FCECDE5}"/>
+          </ac:picMkLst>
+        </pc:picChg>
+      </pc:sldChg>
+      <pc:sldChg chg="addSp delSp modSp add mod">
+        <pc:chgData name="Joey Hieronimy" userId="fd3028d6-393c-4fce-a437-fa424271b488" providerId="ADAL" clId="{AC3B7B92-2650-D341-8179-AF296BB068D9}" dt="2024-01-26T09:43:36.953" v="210" actId="20577"/>
+        <pc:sldMkLst>
+          <pc:docMk/>
+          <pc:sldMk cId="3463233712" sldId="290"/>
+        </pc:sldMkLst>
+        <pc:spChg chg="mod">
+          <ac:chgData name="Joey Hieronimy" userId="fd3028d6-393c-4fce-a437-fa424271b488" providerId="ADAL" clId="{AC3B7B92-2650-D341-8179-AF296BB068D9}" dt="2024-01-26T09:43:36.953" v="210" actId="20577"/>
+          <ac:spMkLst>
+            <pc:docMk/>
+            <pc:sldMk cId="3463233712" sldId="290"/>
+            <ac:spMk id="4" creationId="{948608C7-C57E-FF5A-D499-235B4C9DDDD1}"/>
+          </ac:spMkLst>
+        </pc:spChg>
+        <pc:spChg chg="add del mod">
+          <ac:chgData name="Joey Hieronimy" userId="fd3028d6-393c-4fce-a437-fa424271b488" providerId="ADAL" clId="{AC3B7B92-2650-D341-8179-AF296BB068D9}" dt="2024-01-26T09:42:09.690" v="149"/>
+          <ac:spMkLst>
+            <pc:docMk/>
+            <pc:sldMk cId="3463233712" sldId="290"/>
+            <ac:spMk id="5" creationId="{8D35FF87-4CD5-7E41-EFAC-706CDDE61110}"/>
+          </ac:spMkLst>
+        </pc:spChg>
+        <pc:picChg chg="del">
+          <ac:chgData name="Joey Hieronimy" userId="fd3028d6-393c-4fce-a437-fa424271b488" providerId="ADAL" clId="{AC3B7B92-2650-D341-8179-AF296BB068D9}" dt="2024-01-26T09:40:38.890" v="53" actId="478"/>
+          <ac:picMkLst>
+            <pc:docMk/>
+            <pc:sldMk cId="3463233712" sldId="290"/>
+            <ac:picMk id="6" creationId="{C1DBC4FC-A48F-F58E-3F8E-9485F16DCCEC}"/>
+          </ac:picMkLst>
+        </pc:picChg>
+        <pc:picChg chg="del">
+          <ac:chgData name="Joey Hieronimy" userId="fd3028d6-393c-4fce-a437-fa424271b488" providerId="ADAL" clId="{AC3B7B92-2650-D341-8179-AF296BB068D9}" dt="2024-01-26T09:40:37.775" v="52" actId="478"/>
+          <ac:picMkLst>
+            <pc:docMk/>
+            <pc:sldMk cId="3463233712" sldId="290"/>
+            <ac:picMk id="8" creationId="{86F81129-C530-7C4B-9F37-3B39DB1B0B05}"/>
+          </ac:picMkLst>
+        </pc:picChg>
+        <pc:picChg chg="add mod">
+          <ac:chgData name="Joey Hieronimy" userId="fd3028d6-393c-4fce-a437-fa424271b488" providerId="ADAL" clId="{AC3B7B92-2650-D341-8179-AF296BB068D9}" dt="2024-01-26T09:42:56.377" v="191" actId="14100"/>
+          <ac:picMkLst>
+            <pc:docMk/>
+            <pc:sldMk cId="3463233712" sldId="290"/>
+            <ac:picMk id="9" creationId="{04340338-6F66-8CAE-9DC0-0BCC90AEE111}"/>
+          </ac:picMkLst>
+        </pc:picChg>
+        <pc:picChg chg="add mod">
+          <ac:chgData name="Joey Hieronimy" userId="fd3028d6-393c-4fce-a437-fa424271b488" providerId="ADAL" clId="{AC3B7B92-2650-D341-8179-AF296BB068D9}" dt="2024-01-26T09:43:05.198" v="192" actId="14100"/>
+          <ac:picMkLst>
+            <pc:docMk/>
+            <pc:sldMk cId="3463233712" sldId="290"/>
+            <ac:picMk id="11" creationId="{45217A6C-0540-CA73-6E76-F8A8CE344BE4}"/>
+          </ac:picMkLst>
+        </pc:picChg>
+        <pc:picChg chg="add mod">
+          <ac:chgData name="Joey Hieronimy" userId="fd3028d6-393c-4fce-a437-fa424271b488" providerId="ADAL" clId="{AC3B7B92-2650-D341-8179-AF296BB068D9}" dt="2024-01-26T09:42:47.244" v="172" actId="1036"/>
+          <ac:picMkLst>
+            <pc:docMk/>
+            <pc:sldMk cId="3463233712" sldId="290"/>
+            <ac:picMk id="13" creationId="{ABA88AA0-6D2B-5570-DFDD-A517DD25840F}"/>
+          </ac:picMkLst>
+        </pc:picChg>
+        <pc:picChg chg="add mod">
+          <ac:chgData name="Joey Hieronimy" userId="fd3028d6-393c-4fce-a437-fa424271b488" providerId="ADAL" clId="{AC3B7B92-2650-D341-8179-AF296BB068D9}" dt="2024-01-26T09:42:41.083" v="165" actId="14100"/>
+          <ac:picMkLst>
+            <pc:docMk/>
+            <pc:sldMk cId="3463233712" sldId="290"/>
+            <ac:picMk id="15" creationId="{DD657772-A702-D98F-1EAC-35FE0696EEC5}"/>
+          </ac:picMkLst>
+        </pc:picChg>
+      </pc:sldChg>
+      <pc:sldChg chg="addSp delSp modSp add mod">
+        <pc:chgData name="Joey Hieronimy" userId="fd3028d6-393c-4fce-a437-fa424271b488" providerId="ADAL" clId="{AC3B7B92-2650-D341-8179-AF296BB068D9}" dt="2024-01-26T09:46:32.787" v="317" actId="1076"/>
+        <pc:sldMkLst>
+          <pc:docMk/>
+          <pc:sldMk cId="2678146319" sldId="291"/>
+        </pc:sldMkLst>
+        <pc:spChg chg="mod">
+          <ac:chgData name="Joey Hieronimy" userId="fd3028d6-393c-4fce-a437-fa424271b488" providerId="ADAL" clId="{AC3B7B92-2650-D341-8179-AF296BB068D9}" dt="2024-01-26T09:45:27.894" v="302" actId="20577"/>
+          <ac:spMkLst>
+            <pc:docMk/>
+            <pc:sldMk cId="2678146319" sldId="291"/>
+            <ac:spMk id="4" creationId="{EA4FF708-56A1-C229-F358-99AE95998AA2}"/>
+          </ac:spMkLst>
+        </pc:spChg>
+        <pc:spChg chg="add del mod">
+          <ac:chgData name="Joey Hieronimy" userId="fd3028d6-393c-4fce-a437-fa424271b488" providerId="ADAL" clId="{AC3B7B92-2650-D341-8179-AF296BB068D9}" dt="2024-01-26T09:44:54.453" v="213"/>
+          <ac:spMkLst>
+            <pc:docMk/>
+            <pc:sldMk cId="2678146319" sldId="291"/>
+            <ac:spMk id="5" creationId="{CAF9FF6D-B406-9BF9-C9E9-6899C68EFBC0}"/>
+          </ac:spMkLst>
+        </pc:spChg>
+        <pc:picChg chg="add mod">
+          <ac:chgData name="Joey Hieronimy" userId="fd3028d6-393c-4fce-a437-fa424271b488" providerId="ADAL" clId="{AC3B7B92-2650-D341-8179-AF296BB068D9}" dt="2024-01-26T09:45:03.256" v="222" actId="1076"/>
+          <ac:picMkLst>
+            <pc:docMk/>
+            <pc:sldMk cId="2678146319" sldId="291"/>
+            <ac:picMk id="7" creationId="{5605AC0B-5BD3-EA5A-59D1-03AB75C9DF9E}"/>
+          </ac:picMkLst>
+        </pc:picChg>
+        <pc:picChg chg="del">
+          <ac:chgData name="Joey Hieronimy" userId="fd3028d6-393c-4fce-a437-fa424271b488" providerId="ADAL" clId="{AC3B7B92-2650-D341-8179-AF296BB068D9}" dt="2024-01-26T09:43:53.269" v="212" actId="478"/>
+          <ac:picMkLst>
+            <pc:docMk/>
+            <pc:sldMk cId="2678146319" sldId="291"/>
+            <ac:picMk id="9" creationId="{76026115-AAFC-BE00-B723-EEAD21817EBF}"/>
+          </ac:picMkLst>
+        </pc:picChg>
+        <pc:picChg chg="add mod">
+          <ac:chgData name="Joey Hieronimy" userId="fd3028d6-393c-4fce-a437-fa424271b488" providerId="ADAL" clId="{AC3B7B92-2650-D341-8179-AF296BB068D9}" dt="2024-01-26T09:46:32.787" v="317" actId="1076"/>
+          <ac:picMkLst>
+            <pc:docMk/>
+            <pc:sldMk cId="2678146319" sldId="291"/>
+            <ac:picMk id="10" creationId="{DE579FF8-0958-3137-F94F-2DAEF494DF32}"/>
+          </ac:picMkLst>
+        </pc:picChg>
+        <pc:picChg chg="del">
+          <ac:chgData name="Joey Hieronimy" userId="fd3028d6-393c-4fce-a437-fa424271b488" providerId="ADAL" clId="{AC3B7B92-2650-D341-8179-AF296BB068D9}" dt="2024-01-26T09:43:53.269" v="212" actId="478"/>
+          <ac:picMkLst>
+            <pc:docMk/>
+            <pc:sldMk cId="2678146319" sldId="291"/>
+            <ac:picMk id="11" creationId="{4A08D94B-5454-A359-CC1F-F61F8AD7A6EF}"/>
+          </ac:picMkLst>
+        </pc:picChg>
+        <pc:picChg chg="del">
+          <ac:chgData name="Joey Hieronimy" userId="fd3028d6-393c-4fce-a437-fa424271b488" providerId="ADAL" clId="{AC3B7B92-2650-D341-8179-AF296BB068D9}" dt="2024-01-26T09:43:53.269" v="212" actId="478"/>
+          <ac:picMkLst>
+            <pc:docMk/>
+            <pc:sldMk cId="2678146319" sldId="291"/>
+            <ac:picMk id="13" creationId="{3C8ABACF-2F8F-B1CF-6A13-7344BFF5FF57}"/>
+          </ac:picMkLst>
+        </pc:picChg>
+        <pc:picChg chg="add mod">
+          <ac:chgData name="Joey Hieronimy" userId="fd3028d6-393c-4fce-a437-fa424271b488" providerId="ADAL" clId="{AC3B7B92-2650-D341-8179-AF296BB068D9}" dt="2024-01-26T09:46:29.930" v="316" actId="1076"/>
+          <ac:picMkLst>
+            <pc:docMk/>
+            <pc:sldMk cId="2678146319" sldId="291"/>
+            <ac:picMk id="14" creationId="{10EDF795-9E00-0D23-BD57-5132E8BFA7B2}"/>
+          </ac:picMkLst>
+        </pc:picChg>
+        <pc:picChg chg="del">
+          <ac:chgData name="Joey Hieronimy" userId="fd3028d6-393c-4fce-a437-fa424271b488" providerId="ADAL" clId="{AC3B7B92-2650-D341-8179-AF296BB068D9}" dt="2024-01-26T09:43:53.269" v="212" actId="478"/>
+          <ac:picMkLst>
+            <pc:docMk/>
+            <pc:sldMk cId="2678146319" sldId="291"/>
+            <ac:picMk id="15" creationId="{1366D7AC-0DB5-14B5-BFE4-D5CC652F8A59}"/>
+          </ac:picMkLst>
+        </pc:picChg>
+      </pc:sldChg>
+      <pc:sldChg chg="addSp delSp modSp add mod">
+        <pc:chgData name="Joey Hieronimy" userId="fd3028d6-393c-4fce-a437-fa424271b488" providerId="ADAL" clId="{AC3B7B92-2650-D341-8179-AF296BB068D9}" dt="2024-01-26T09:48:57.335" v="374" actId="1076"/>
+        <pc:sldMkLst>
+          <pc:docMk/>
+          <pc:sldMk cId="3783565773" sldId="292"/>
+        </pc:sldMkLst>
+        <pc:spChg chg="add del mod">
+          <ac:chgData name="Joey Hieronimy" userId="fd3028d6-393c-4fce-a437-fa424271b488" providerId="ADAL" clId="{AC3B7B92-2650-D341-8179-AF296BB068D9}" dt="2024-01-26T09:48:33.667" v="365" actId="20577"/>
+          <ac:spMkLst>
+            <pc:docMk/>
+            <pc:sldMk cId="3783565773" sldId="292"/>
+            <ac:spMk id="4" creationId="{15582982-D689-31EB-73A0-1165C13ACE7A}"/>
+          </ac:spMkLst>
+        </pc:spChg>
+        <pc:spChg chg="add del mod">
+          <ac:chgData name="Joey Hieronimy" userId="fd3028d6-393c-4fce-a437-fa424271b488" providerId="ADAL" clId="{AC3B7B92-2650-D341-8179-AF296BB068D9}" dt="2024-01-26T09:48:41.349" v="366"/>
+          <ac:spMkLst>
+            <pc:docMk/>
+            <pc:sldMk cId="3783565773" sldId="292"/>
+            <ac:spMk id="5" creationId="{2681F4BE-9FDD-FCD2-DF62-732C55E8E902}"/>
+          </ac:spMkLst>
+        </pc:spChg>
+        <pc:picChg chg="del">
+          <ac:chgData name="Joey Hieronimy" userId="fd3028d6-393c-4fce-a437-fa424271b488" providerId="ADAL" clId="{AC3B7B92-2650-D341-8179-AF296BB068D9}" dt="2024-01-26T09:47:04.155" v="319" actId="478"/>
+          <ac:picMkLst>
+            <pc:docMk/>
+            <pc:sldMk cId="3783565773" sldId="292"/>
+            <ac:picMk id="7" creationId="{01528AB1-4FDF-B4F3-0DF9-B4063B4D3AD8}"/>
+          </ac:picMkLst>
+        </pc:picChg>
+        <pc:picChg chg="add mod">
+          <ac:chgData name="Joey Hieronimy" userId="fd3028d6-393c-4fce-a437-fa424271b488" providerId="ADAL" clId="{AC3B7B92-2650-D341-8179-AF296BB068D9}" dt="2024-01-26T09:48:17.820" v="327"/>
+          <ac:picMkLst>
+            <pc:docMk/>
+            <pc:sldMk cId="3783565773" sldId="292"/>
+            <ac:picMk id="8" creationId="{357C40B7-71B6-C882-903E-00FADD0DCA9F}"/>
+          </ac:picMkLst>
+        </pc:picChg>
+        <pc:picChg chg="del">
+          <ac:chgData name="Joey Hieronimy" userId="fd3028d6-393c-4fce-a437-fa424271b488" providerId="ADAL" clId="{AC3B7B92-2650-D341-8179-AF296BB068D9}" dt="2024-01-26T09:47:04.155" v="319" actId="478"/>
+          <ac:picMkLst>
+            <pc:docMk/>
+            <pc:sldMk cId="3783565773" sldId="292"/>
+            <ac:picMk id="10" creationId="{9BA601CD-CD2A-F3AF-3461-C77B99772F03}"/>
+          </ac:picMkLst>
+        </pc:picChg>
+        <pc:picChg chg="add mod">
+          <ac:chgData name="Joey Hieronimy" userId="fd3028d6-393c-4fce-a437-fa424271b488" providerId="ADAL" clId="{AC3B7B92-2650-D341-8179-AF296BB068D9}" dt="2024-01-26T09:48:17.820" v="327"/>
+          <ac:picMkLst>
+            <pc:docMk/>
+            <pc:sldMk cId="3783565773" sldId="292"/>
+            <ac:picMk id="11" creationId="{38ECD7F4-FA0E-3210-F451-B8EFECC4B2D2}"/>
+          </ac:picMkLst>
+        </pc:picChg>
+        <pc:picChg chg="add mod">
+          <ac:chgData name="Joey Hieronimy" userId="fd3028d6-393c-4fce-a437-fa424271b488" providerId="ADAL" clId="{AC3B7B92-2650-D341-8179-AF296BB068D9}" dt="2024-01-26T09:48:57.335" v="374" actId="1076"/>
+          <ac:picMkLst>
+            <pc:docMk/>
+            <pc:sldMk cId="3783565773" sldId="292"/>
+            <ac:picMk id="13" creationId="{04594947-474F-9A47-028A-75BD799CA892}"/>
+          </ac:picMkLst>
+        </pc:picChg>
+        <pc:picChg chg="del">
+          <ac:chgData name="Joey Hieronimy" userId="fd3028d6-393c-4fce-a437-fa424271b488" providerId="ADAL" clId="{AC3B7B92-2650-D341-8179-AF296BB068D9}" dt="2024-01-26T09:47:04.155" v="319" actId="478"/>
+          <ac:picMkLst>
+            <pc:docMk/>
+            <pc:sldMk cId="3783565773" sldId="292"/>
+            <ac:picMk id="14" creationId="{17EB5C47-3BE3-CEF7-4D0B-3BBFE832D9F3}"/>
+          </ac:picMkLst>
+        </pc:picChg>
+        <pc:picChg chg="add mod">
+          <ac:chgData name="Joey Hieronimy" userId="fd3028d6-393c-4fce-a437-fa424271b488" providerId="ADAL" clId="{AC3B7B92-2650-D341-8179-AF296BB068D9}" dt="2024-01-26T09:48:50.322" v="372" actId="1076"/>
+          <ac:picMkLst>
+            <pc:docMk/>
+            <pc:sldMk cId="3783565773" sldId="292"/>
+            <ac:picMk id="16" creationId="{6EF9B453-FE21-E26D-D3E4-CF724D4BB492}"/>
+          </ac:picMkLst>
+        </pc:picChg>
+      </pc:sldChg>
+      <pc:sldChg chg="addSp delSp modSp add mod">
+        <pc:chgData name="Joey Hieronimy" userId="fd3028d6-393c-4fce-a437-fa424271b488" providerId="ADAL" clId="{AC3B7B92-2650-D341-8179-AF296BB068D9}" dt="2024-01-26T09:58:59.331" v="580" actId="1076"/>
+        <pc:sldMkLst>
+          <pc:docMk/>
+          <pc:sldMk cId="3014666407" sldId="293"/>
+        </pc:sldMkLst>
+        <pc:spChg chg="del mod">
+          <ac:chgData name="Joey Hieronimy" userId="fd3028d6-393c-4fce-a437-fa424271b488" providerId="ADAL" clId="{AC3B7B92-2650-D341-8179-AF296BB068D9}" dt="2024-01-26T09:58:44.556" v="573"/>
+          <ac:spMkLst>
+            <pc:docMk/>
+            <pc:sldMk cId="3014666407" sldId="293"/>
+            <ac:spMk id="4" creationId="{8DEFFE4F-9AFF-4C3E-7470-B9428522A328}"/>
+          </ac:spMkLst>
+        </pc:spChg>
+        <pc:spChg chg="add del mod">
+          <ac:chgData name="Joey Hieronimy" userId="fd3028d6-393c-4fce-a437-fa424271b488" providerId="ADAL" clId="{AC3B7B92-2650-D341-8179-AF296BB068D9}" dt="2024-01-26T09:58:53.963" v="578" actId="478"/>
+          <ac:spMkLst>
+            <pc:docMk/>
+            <pc:sldMk cId="3014666407" sldId="293"/>
+            <ac:spMk id="5" creationId="{4765E602-20AB-6BCB-3A1B-533E23C54215}"/>
+          </ac:spMkLst>
+        </pc:spChg>
+        <pc:picChg chg="del">
+          <ac:chgData name="Joey Hieronimy" userId="fd3028d6-393c-4fce-a437-fa424271b488" providerId="ADAL" clId="{AC3B7B92-2650-D341-8179-AF296BB068D9}" dt="2024-01-26T09:58:32.698" v="571" actId="478"/>
+          <ac:picMkLst>
+            <pc:docMk/>
+            <pc:sldMk cId="3014666407" sldId="293"/>
+            <ac:picMk id="6" creationId="{7EC09886-4461-4E3D-5A1A-5229166238C4}"/>
+          </ac:picMkLst>
+        </pc:picChg>
+        <pc:picChg chg="del">
+          <ac:chgData name="Joey Hieronimy" userId="fd3028d6-393c-4fce-a437-fa424271b488" providerId="ADAL" clId="{AC3B7B92-2650-D341-8179-AF296BB068D9}" dt="2024-01-26T09:58:32.698" v="571" actId="478"/>
+          <ac:picMkLst>
+            <pc:docMk/>
+            <pc:sldMk cId="3014666407" sldId="293"/>
+            <ac:picMk id="8" creationId="{52C1F180-D8FA-F7AB-8ECD-934EB1E24045}"/>
+          </ac:picMkLst>
+        </pc:picChg>
+        <pc:picChg chg="add mod">
+          <ac:chgData name="Joey Hieronimy" userId="fd3028d6-393c-4fce-a437-fa424271b488" providerId="ADAL" clId="{AC3B7B92-2650-D341-8179-AF296BB068D9}" dt="2024-01-26T09:58:59.331" v="580" actId="1076"/>
+          <ac:picMkLst>
+            <pc:docMk/>
+            <pc:sldMk cId="3014666407" sldId="293"/>
+            <ac:picMk id="9" creationId="{CCBBA6E2-3DC4-DB42-7B46-8B10D65249E7}"/>
+          </ac:picMkLst>
+        </pc:picChg>
+      </pc:sldChg>
+    </pc:docChg>
+  </pc:docChgLst>
+</pc:chgInfo>
+</file>
+
 <file path=ppt/handoutMasters/handoutMaster1.xml><?xml version="1.0" encoding="utf-8"?>
 <p:handoutMaster xmlns:a="http://schemas.openxmlformats.org/drawingml/2006/main" xmlns:r="http://schemas.openxmlformats.org/officeDocument/2006/relationships" xmlns:p="http://schemas.openxmlformats.org/presentationml/2006/main">
   <p:cSld>
@@ -231,7 +611,7 @@
           <a:p>
             <a:fld id="{B535FBCA-7827-204B-8916-3BD441F72BB8}" type="datetimeFigureOut">
               <a:rPr lang="de-DE" smtClean="0"/>
-              <a:t>25.01.24</a:t>
+              <a:t>26.01.24</a:t>
             </a:fld>
             <a:endParaRPr lang="de-DE"/>
           </a:p>
@@ -424,7 +804,7 @@
           <a:p>
             <a:fld id="{842CE5A1-857B-214D-8BEE-AF65CEFCD544}" type="datetimeFigureOut">
               <a:rPr lang="de-DE" smtClean="0"/>
-              <a:t>25.01.24</a:t>
+              <a:t>26.01.24</a:t>
             </a:fld>
             <a:endParaRPr lang="de-DE"/>
           </a:p>
@@ -5878,16 +6258,48 @@
           <a:bodyPr/>
           <a:lstStyle/>
           <a:p>
-            <a:endParaRPr lang="en-AT" dirty="0"/>
-          </a:p>
-        </p:txBody>
-      </p:sp>
-      <p:sp>
-        <p:nvSpPr>
-          <p:cNvPr id="5" name="Content Placeholder 4">
-            <a:extLst>
-              <a:ext uri="{FF2B5EF4-FFF2-40B4-BE49-F238E27FC236}">
-                <a16:creationId xmlns:a16="http://schemas.microsoft.com/office/drawing/2014/main" id="{0973C85F-FA7F-4E60-485A-F04E2D29ED66}"/>
+            <a:r>
+              <a:rPr lang="en-AT" dirty="0"/>
+              <a:t>First attempt: generate RML with no info</a:t>
+            </a:r>
+          </a:p>
+        </p:txBody>
+      </p:sp>
+      <p:pic>
+        <p:nvPicPr>
+          <p:cNvPr id="6" name="Content Placeholder 5" descr="A screen shot of a computer program&#10;&#10;Description automatically generated">
+            <a:extLst>
+              <a:ext uri="{FF2B5EF4-FFF2-40B4-BE49-F238E27FC236}">
+                <a16:creationId xmlns:a16="http://schemas.microsoft.com/office/drawing/2014/main" id="{29148A47-DA1A-84F3-30D8-4C5100FD90DD}"/>
+              </a:ext>
+            </a:extLst>
+          </p:cNvPr>
+          <p:cNvPicPr>
+            <a:picLocks noGrp="1" noChangeAspect="1"/>
+          </p:cNvPicPr>
+          <p:nvPr>
+            <p:ph sz="half" idx="13"/>
+          </p:nvPr>
+        </p:nvPicPr>
+        <p:blipFill>
+          <a:blip r:embed="rId2"/>
+          <a:stretch>
+            <a:fillRect/>
+          </a:stretch>
+        </p:blipFill>
+        <p:spPr>
+          <a:xfrm>
+            <a:off x="6716192" y="692841"/>
+            <a:ext cx="4537116" cy="5472318"/>
+          </a:xfrm>
+        </p:spPr>
+      </p:pic>
+      <p:sp>
+        <p:nvSpPr>
+          <p:cNvPr id="3" name="Title 2">
+            <a:extLst>
+              <a:ext uri="{FF2B5EF4-FFF2-40B4-BE49-F238E27FC236}">
+                <a16:creationId xmlns:a16="http://schemas.microsoft.com/office/drawing/2014/main" id="{31B33511-7BD8-EB72-1039-625EB65C1FB9}"/>
               </a:ext>
             </a:extLst>
           </p:cNvPr>
@@ -5895,7 +6307,7 @@
             <a:spLocks noGrp="1"/>
           </p:cNvSpPr>
           <p:nvPr>
-            <p:ph sz="half" idx="13"/>
+            <p:ph type="ctrTitle"/>
           </p:nvPr>
         </p:nvSpPr>
         <p:spPr/>
@@ -5903,31 +6315,6 @@
           <a:bodyPr/>
           <a:lstStyle/>
           <a:p>
-            <a:endParaRPr lang="en-AT"/>
-          </a:p>
-        </p:txBody>
-      </p:sp>
-      <p:sp>
-        <p:nvSpPr>
-          <p:cNvPr id="3" name="Title 2">
-            <a:extLst>
-              <a:ext uri="{FF2B5EF4-FFF2-40B4-BE49-F238E27FC236}">
-                <a16:creationId xmlns:a16="http://schemas.microsoft.com/office/drawing/2014/main" id="{31B33511-7BD8-EB72-1039-625EB65C1FB9}"/>
-              </a:ext>
-            </a:extLst>
-          </p:cNvPr>
-          <p:cNvSpPr>
-            <a:spLocks noGrp="1"/>
-          </p:cNvSpPr>
-          <p:nvPr>
-            <p:ph type="ctrTitle"/>
-          </p:nvPr>
-        </p:nvSpPr>
-        <p:spPr/>
-        <p:txBody>
-          <a:bodyPr/>
-          <a:lstStyle/>
-          <a:p>
             <a:r>
               <a:rPr lang="en-AT" dirty="0"/>
               <a:t>RML – Zero-Shot</a:t>
@@ -5935,6 +6322,36 @@
           </a:p>
         </p:txBody>
       </p:sp>
+      <p:pic>
+        <p:nvPicPr>
+          <p:cNvPr id="8" name="Picture 7" descr="A black text on a white background&#10;&#10;Description automatically generated">
+            <a:extLst>
+              <a:ext uri="{FF2B5EF4-FFF2-40B4-BE49-F238E27FC236}">
+                <a16:creationId xmlns:a16="http://schemas.microsoft.com/office/drawing/2014/main" id="{EE91B31A-40FC-0DBA-2617-FA19612D3AC1}"/>
+              </a:ext>
+            </a:extLst>
+          </p:cNvPr>
+          <p:cNvPicPr>
+            <a:picLocks noChangeAspect="1"/>
+          </p:cNvPicPr>
+          <p:nvPr/>
+        </p:nvPicPr>
+        <p:blipFill>
+          <a:blip r:embed="rId3"/>
+          <a:stretch>
+            <a:fillRect/>
+          </a:stretch>
+        </p:blipFill>
+        <p:spPr>
+          <a:xfrm>
+            <a:off x="766763" y="3065147"/>
+            <a:ext cx="4929332" cy="727705"/>
+          </a:xfrm>
+          <a:prstGeom prst="rect">
+            <a:avLst/>
+          </a:prstGeom>
+        </p:spPr>
+      </p:pic>
     </p:spTree>
     <p:extLst>
       <p:ext uri="{BB962C8B-B14F-4D97-AF65-F5344CB8AC3E}">
@@ -5949,6 +6366,567 @@
 </file>
 
 <file path=ppt/slides/slide15.xml><?xml version="1.0" encoding="utf-8"?>
+<p:sld xmlns:a="http://schemas.openxmlformats.org/drawingml/2006/main" xmlns:r="http://schemas.openxmlformats.org/officeDocument/2006/relationships" xmlns:p="http://schemas.openxmlformats.org/presentationml/2006/main">
+  <p:cSld>
+    <p:spTree>
+      <p:nvGrpSpPr>
+        <p:cNvPr id="1" name="">
+          <a:extLst>
+            <a:ext uri="{FF2B5EF4-FFF2-40B4-BE49-F238E27FC236}">
+              <a16:creationId xmlns:a16="http://schemas.microsoft.com/office/drawing/2014/main" id="{A92C7CAA-5772-A06C-B5E4-37284BBFF8EC}"/>
+            </a:ext>
+          </a:extLst>
+        </p:cNvPr>
+        <p:cNvGrpSpPr/>
+        <p:nvPr/>
+      </p:nvGrpSpPr>
+      <p:grpSpPr>
+        <a:xfrm>
+          <a:off x="0" y="0"/>
+          <a:ext cx="0" cy="0"/>
+          <a:chOff x="0" y="0"/>
+          <a:chExt cx="0" cy="0"/>
+        </a:xfrm>
+      </p:grpSpPr>
+      <p:sp>
+        <p:nvSpPr>
+          <p:cNvPr id="4" name="Content Placeholder 3">
+            <a:extLst>
+              <a:ext uri="{FF2B5EF4-FFF2-40B4-BE49-F238E27FC236}">
+                <a16:creationId xmlns:a16="http://schemas.microsoft.com/office/drawing/2014/main" id="{948608C7-C57E-FF5A-D499-235B4C9DDDD1}"/>
+              </a:ext>
+            </a:extLst>
+          </p:cNvPr>
+          <p:cNvSpPr>
+            <a:spLocks noGrp="1"/>
+          </p:cNvSpPr>
+          <p:nvPr>
+            <p:ph sz="half" idx="1"/>
+          </p:nvPr>
+        </p:nvSpPr>
+        <p:spPr/>
+        <p:txBody>
+          <a:bodyPr/>
+          <a:lstStyle/>
+          <a:p>
+            <a:r>
+              <a:rPr lang="en-AT" dirty="0"/>
+              <a:t>Result improved after providing more details</a:t>
+            </a:r>
+          </a:p>
+          <a:p>
+            <a:r>
+              <a:rPr lang="en-AT" dirty="0"/>
+              <a:t>No schema prefix!</a:t>
+            </a:r>
+          </a:p>
+        </p:txBody>
+      </p:sp>
+      <p:sp>
+        <p:nvSpPr>
+          <p:cNvPr id="3" name="Title 2">
+            <a:extLst>
+              <a:ext uri="{FF2B5EF4-FFF2-40B4-BE49-F238E27FC236}">
+                <a16:creationId xmlns:a16="http://schemas.microsoft.com/office/drawing/2014/main" id="{3D3D936B-2051-5122-E6AA-F7BBB83EBEB5}"/>
+              </a:ext>
+            </a:extLst>
+          </p:cNvPr>
+          <p:cNvSpPr>
+            <a:spLocks noGrp="1"/>
+          </p:cNvSpPr>
+          <p:nvPr>
+            <p:ph type="ctrTitle"/>
+          </p:nvPr>
+        </p:nvSpPr>
+        <p:spPr/>
+        <p:txBody>
+          <a:bodyPr/>
+          <a:lstStyle/>
+          <a:p>
+            <a:r>
+              <a:rPr lang="en-AT" dirty="0"/>
+              <a:t>RML – Zero-Shot</a:t>
+            </a:r>
+          </a:p>
+        </p:txBody>
+      </p:sp>
+      <p:pic>
+        <p:nvPicPr>
+          <p:cNvPr id="9" name="Content Placeholder 8" descr="A white background with black text&#10;&#10;Description automatically generated">
+            <a:extLst>
+              <a:ext uri="{FF2B5EF4-FFF2-40B4-BE49-F238E27FC236}">
+                <a16:creationId xmlns:a16="http://schemas.microsoft.com/office/drawing/2014/main" id="{04340338-6F66-8CAE-9DC0-0BCC90AEE111}"/>
+              </a:ext>
+            </a:extLst>
+          </p:cNvPr>
+          <p:cNvPicPr>
+            <a:picLocks noGrp="1" noChangeAspect="1"/>
+          </p:cNvPicPr>
+          <p:nvPr>
+            <p:ph sz="half" idx="13"/>
+          </p:nvPr>
+        </p:nvPicPr>
+        <p:blipFill>
+          <a:blip r:embed="rId2"/>
+          <a:stretch>
+            <a:fillRect/>
+          </a:stretch>
+        </p:blipFill>
+        <p:spPr>
+          <a:xfrm>
+            <a:off x="169863" y="2278752"/>
+            <a:ext cx="5532937" cy="1706623"/>
+          </a:xfrm>
+        </p:spPr>
+      </p:pic>
+      <p:pic>
+        <p:nvPicPr>
+          <p:cNvPr id="11" name="Picture 10">
+            <a:extLst>
+              <a:ext uri="{FF2B5EF4-FFF2-40B4-BE49-F238E27FC236}">
+                <a16:creationId xmlns:a16="http://schemas.microsoft.com/office/drawing/2014/main" id="{45217A6C-0540-CA73-6E76-F8A8CE344BE4}"/>
+              </a:ext>
+            </a:extLst>
+          </p:cNvPr>
+          <p:cNvPicPr>
+            <a:picLocks noChangeAspect="1"/>
+          </p:cNvPicPr>
+          <p:nvPr/>
+        </p:nvPicPr>
+        <p:blipFill>
+          <a:blip r:embed="rId3"/>
+          <a:stretch>
+            <a:fillRect/>
+          </a:stretch>
+        </p:blipFill>
+        <p:spPr>
+          <a:xfrm>
+            <a:off x="169863" y="4208898"/>
+            <a:ext cx="5532937" cy="546982"/>
+          </a:xfrm>
+          <a:prstGeom prst="rect">
+            <a:avLst/>
+          </a:prstGeom>
+        </p:spPr>
+      </p:pic>
+      <p:pic>
+        <p:nvPicPr>
+          <p:cNvPr id="13" name="Picture 12" descr="A screenshot of a computer screen&#10;&#10;Description automatically generated">
+            <a:extLst>
+              <a:ext uri="{FF2B5EF4-FFF2-40B4-BE49-F238E27FC236}">
+                <a16:creationId xmlns:a16="http://schemas.microsoft.com/office/drawing/2014/main" id="{ABA88AA0-6D2B-5570-DFDD-A517DD25840F}"/>
+              </a:ext>
+            </a:extLst>
+          </p:cNvPr>
+          <p:cNvPicPr>
+            <a:picLocks noChangeAspect="1"/>
+          </p:cNvPicPr>
+          <p:nvPr/>
+        </p:nvPicPr>
+        <p:blipFill>
+          <a:blip r:embed="rId4"/>
+          <a:stretch>
+            <a:fillRect/>
+          </a:stretch>
+        </p:blipFill>
+        <p:spPr>
+          <a:xfrm>
+            <a:off x="6359149" y="96985"/>
+            <a:ext cx="5512737" cy="4556446"/>
+          </a:xfrm>
+          <a:prstGeom prst="rect">
+            <a:avLst/>
+          </a:prstGeom>
+        </p:spPr>
+      </p:pic>
+      <p:pic>
+        <p:nvPicPr>
+          <p:cNvPr id="15" name="Picture 14" descr="A computer screen with white text&#10;&#10;Description automatically generated">
+            <a:extLst>
+              <a:ext uri="{FF2B5EF4-FFF2-40B4-BE49-F238E27FC236}">
+                <a16:creationId xmlns:a16="http://schemas.microsoft.com/office/drawing/2014/main" id="{DD657772-A702-D98F-1EAC-35FE0696EEC5}"/>
+              </a:ext>
+            </a:extLst>
+          </p:cNvPr>
+          <p:cNvPicPr>
+            <a:picLocks noChangeAspect="1"/>
+          </p:cNvPicPr>
+          <p:nvPr/>
+        </p:nvPicPr>
+        <p:blipFill>
+          <a:blip r:embed="rId5"/>
+          <a:stretch>
+            <a:fillRect/>
+          </a:stretch>
+        </p:blipFill>
+        <p:spPr>
+          <a:xfrm>
+            <a:off x="6359148" y="4759325"/>
+            <a:ext cx="5512738" cy="1980085"/>
+          </a:xfrm>
+          <a:prstGeom prst="rect">
+            <a:avLst/>
+          </a:prstGeom>
+        </p:spPr>
+      </p:pic>
+    </p:spTree>
+    <p:extLst>
+      <p:ext uri="{BB962C8B-B14F-4D97-AF65-F5344CB8AC3E}">
+        <p14:creationId xmlns:p14="http://schemas.microsoft.com/office/powerpoint/2010/main" val="3463233712"/>
+      </p:ext>
+    </p:extLst>
+  </p:cSld>
+  <p:clrMapOvr>
+    <a:masterClrMapping/>
+  </p:clrMapOvr>
+</p:sld>
+</file>
+
+<file path=ppt/slides/slide16.xml><?xml version="1.0" encoding="utf-8"?>
+<p:sld xmlns:a="http://schemas.openxmlformats.org/drawingml/2006/main" xmlns:r="http://schemas.openxmlformats.org/officeDocument/2006/relationships" xmlns:p="http://schemas.openxmlformats.org/presentationml/2006/main">
+  <p:cSld>
+    <p:spTree>
+      <p:nvGrpSpPr>
+        <p:cNvPr id="1" name="">
+          <a:extLst>
+            <a:ext uri="{FF2B5EF4-FFF2-40B4-BE49-F238E27FC236}">
+              <a16:creationId xmlns:a16="http://schemas.microsoft.com/office/drawing/2014/main" id="{9D3A99DE-E53C-C15A-E4BB-0BE64E520662}"/>
+            </a:ext>
+          </a:extLst>
+        </p:cNvPr>
+        <p:cNvGrpSpPr/>
+        <p:nvPr/>
+      </p:nvGrpSpPr>
+      <p:grpSpPr>
+        <a:xfrm>
+          <a:off x="0" y="0"/>
+          <a:ext cx="0" cy="0"/>
+          <a:chOff x="0" y="0"/>
+          <a:chExt cx="0" cy="0"/>
+        </a:xfrm>
+      </p:grpSpPr>
+      <p:sp>
+        <p:nvSpPr>
+          <p:cNvPr id="4" name="Content Placeholder 3">
+            <a:extLst>
+              <a:ext uri="{FF2B5EF4-FFF2-40B4-BE49-F238E27FC236}">
+                <a16:creationId xmlns:a16="http://schemas.microsoft.com/office/drawing/2014/main" id="{EA4FF708-56A1-C229-F358-99AE95998AA2}"/>
+              </a:ext>
+            </a:extLst>
+          </p:cNvPr>
+          <p:cNvSpPr>
+            <a:spLocks noGrp="1"/>
+          </p:cNvSpPr>
+          <p:nvPr>
+            <p:ph sz="half" idx="1"/>
+          </p:nvPr>
+        </p:nvSpPr>
+        <p:spPr/>
+        <p:txBody>
+          <a:bodyPr/>
+          <a:lstStyle/>
+          <a:p>
+            <a:r>
+              <a:rPr lang="en-AT" dirty="0"/>
+              <a:t>Next only example data given</a:t>
+            </a:r>
+          </a:p>
+          <a:p>
+            <a:r>
+              <a:rPr lang="en-AT" dirty="0"/>
+              <a:t>Didn’t generate the entire file</a:t>
+            </a:r>
+          </a:p>
+          <a:p>
+            <a:r>
+              <a:rPr lang="en-AT" dirty="0"/>
+              <a:t>No schema</a:t>
+            </a:r>
+          </a:p>
+        </p:txBody>
+      </p:sp>
+      <p:sp>
+        <p:nvSpPr>
+          <p:cNvPr id="3" name="Title 2">
+            <a:extLst>
+              <a:ext uri="{FF2B5EF4-FFF2-40B4-BE49-F238E27FC236}">
+                <a16:creationId xmlns:a16="http://schemas.microsoft.com/office/drawing/2014/main" id="{15977FC6-EF54-D08C-0865-38C4B90D9CF1}"/>
+              </a:ext>
+            </a:extLst>
+          </p:cNvPr>
+          <p:cNvSpPr>
+            <a:spLocks noGrp="1"/>
+          </p:cNvSpPr>
+          <p:nvPr>
+            <p:ph type="ctrTitle"/>
+          </p:nvPr>
+        </p:nvSpPr>
+        <p:spPr/>
+        <p:txBody>
+          <a:bodyPr/>
+          <a:lstStyle/>
+          <a:p>
+            <a:r>
+              <a:rPr lang="en-AT" dirty="0"/>
+              <a:t>RML – Zero-Shot</a:t>
+            </a:r>
+          </a:p>
+        </p:txBody>
+      </p:sp>
+      <p:pic>
+        <p:nvPicPr>
+          <p:cNvPr id="7" name="Content Placeholder 6" descr="A screenshot of a computer&#10;&#10;Description automatically generated">
+            <a:extLst>
+              <a:ext uri="{FF2B5EF4-FFF2-40B4-BE49-F238E27FC236}">
+                <a16:creationId xmlns:a16="http://schemas.microsoft.com/office/drawing/2014/main" id="{5605AC0B-5BD3-EA5A-59D1-03AB75C9DF9E}"/>
+              </a:ext>
+            </a:extLst>
+          </p:cNvPr>
+          <p:cNvPicPr>
+            <a:picLocks noGrp="1" noChangeAspect="1"/>
+          </p:cNvPicPr>
+          <p:nvPr>
+            <p:ph sz="half" idx="13"/>
+          </p:nvPr>
+        </p:nvPicPr>
+        <p:blipFill>
+          <a:blip r:embed="rId2"/>
+          <a:stretch>
+            <a:fillRect/>
+          </a:stretch>
+        </p:blipFill>
+        <p:spPr>
+          <a:xfrm>
+            <a:off x="213447" y="2826835"/>
+            <a:ext cx="4312803" cy="1204330"/>
+          </a:xfrm>
+        </p:spPr>
+      </p:pic>
+      <p:pic>
+        <p:nvPicPr>
+          <p:cNvPr id="10" name="Picture 9" descr="A screen shot of a computer code&#10;&#10;Description automatically generated">
+            <a:extLst>
+              <a:ext uri="{FF2B5EF4-FFF2-40B4-BE49-F238E27FC236}">
+                <a16:creationId xmlns:a16="http://schemas.microsoft.com/office/drawing/2014/main" id="{DE579FF8-0958-3137-F94F-2DAEF494DF32}"/>
+              </a:ext>
+            </a:extLst>
+          </p:cNvPr>
+          <p:cNvPicPr>
+            <a:picLocks noChangeAspect="1"/>
+          </p:cNvPicPr>
+          <p:nvPr/>
+        </p:nvPicPr>
+        <p:blipFill>
+          <a:blip r:embed="rId3"/>
+          <a:stretch>
+            <a:fillRect/>
+          </a:stretch>
+        </p:blipFill>
+        <p:spPr>
+          <a:xfrm>
+            <a:off x="8680707" y="2135390"/>
+            <a:ext cx="3804118" cy="2731681"/>
+          </a:xfrm>
+          <a:prstGeom prst="rect">
+            <a:avLst/>
+          </a:prstGeom>
+        </p:spPr>
+      </p:pic>
+      <p:pic>
+        <p:nvPicPr>
+          <p:cNvPr id="14" name="Picture 13" descr="A screen shot of a computer program&#10;&#10;Description automatically generated">
+            <a:extLst>
+              <a:ext uri="{FF2B5EF4-FFF2-40B4-BE49-F238E27FC236}">
+                <a16:creationId xmlns:a16="http://schemas.microsoft.com/office/drawing/2014/main" id="{10EDF795-9E00-0D23-BD57-5132E8BFA7B2}"/>
+              </a:ext>
+            </a:extLst>
+          </p:cNvPr>
+          <p:cNvPicPr>
+            <a:picLocks noChangeAspect="1"/>
+          </p:cNvPicPr>
+          <p:nvPr/>
+        </p:nvPicPr>
+        <p:blipFill>
+          <a:blip r:embed="rId4"/>
+          <a:stretch>
+            <a:fillRect/>
+          </a:stretch>
+        </p:blipFill>
+        <p:spPr>
+          <a:xfrm>
+            <a:off x="4876589" y="1125538"/>
+            <a:ext cx="3804118" cy="4957494"/>
+          </a:xfrm>
+          <a:prstGeom prst="rect">
+            <a:avLst/>
+          </a:prstGeom>
+        </p:spPr>
+      </p:pic>
+    </p:spTree>
+    <p:extLst>
+      <p:ext uri="{BB962C8B-B14F-4D97-AF65-F5344CB8AC3E}">
+        <p14:creationId xmlns:p14="http://schemas.microsoft.com/office/powerpoint/2010/main" val="2678146319"/>
+      </p:ext>
+    </p:extLst>
+  </p:cSld>
+  <p:clrMapOvr>
+    <a:masterClrMapping/>
+  </p:clrMapOvr>
+</p:sld>
+</file>
+
+<file path=ppt/slides/slide17.xml><?xml version="1.0" encoding="utf-8"?>
+<p:sld xmlns:a="http://schemas.openxmlformats.org/drawingml/2006/main" xmlns:r="http://schemas.openxmlformats.org/officeDocument/2006/relationships" xmlns:p="http://schemas.openxmlformats.org/presentationml/2006/main">
+  <p:cSld>
+    <p:spTree>
+      <p:nvGrpSpPr>
+        <p:cNvPr id="1" name="">
+          <a:extLst>
+            <a:ext uri="{FF2B5EF4-FFF2-40B4-BE49-F238E27FC236}">
+              <a16:creationId xmlns:a16="http://schemas.microsoft.com/office/drawing/2014/main" id="{9091DB8D-8418-3B2E-138C-FF490C612F22}"/>
+            </a:ext>
+          </a:extLst>
+        </p:cNvPr>
+        <p:cNvGrpSpPr/>
+        <p:nvPr/>
+      </p:nvGrpSpPr>
+      <p:grpSpPr>
+        <a:xfrm>
+          <a:off x="0" y="0"/>
+          <a:ext cx="0" cy="0"/>
+          <a:chOff x="0" y="0"/>
+          <a:chExt cx="0" cy="0"/>
+        </a:xfrm>
+      </p:grpSpPr>
+      <p:sp>
+        <p:nvSpPr>
+          <p:cNvPr id="4" name="Content Placeholder 3">
+            <a:extLst>
+              <a:ext uri="{FF2B5EF4-FFF2-40B4-BE49-F238E27FC236}">
+                <a16:creationId xmlns:a16="http://schemas.microsoft.com/office/drawing/2014/main" id="{15582982-D689-31EB-73A0-1165C13ACE7A}"/>
+              </a:ext>
+            </a:extLst>
+          </p:cNvPr>
+          <p:cNvSpPr>
+            <a:spLocks noGrp="1"/>
+          </p:cNvSpPr>
+          <p:nvPr>
+            <p:ph sz="half" idx="1"/>
+          </p:nvPr>
+        </p:nvSpPr>
+        <p:spPr/>
+        <p:txBody>
+          <a:bodyPr/>
+          <a:lstStyle/>
+          <a:p>
+            <a:r>
+              <a:rPr lang="en-AT" dirty="0"/>
+              <a:t>Finally, all information provided:</a:t>
+            </a:r>
+          </a:p>
+        </p:txBody>
+      </p:sp>
+      <p:sp>
+        <p:nvSpPr>
+          <p:cNvPr id="3" name="Title 2">
+            <a:extLst>
+              <a:ext uri="{FF2B5EF4-FFF2-40B4-BE49-F238E27FC236}">
+                <a16:creationId xmlns:a16="http://schemas.microsoft.com/office/drawing/2014/main" id="{12805290-EB56-2ACB-9E42-B629C090CF77}"/>
+              </a:ext>
+            </a:extLst>
+          </p:cNvPr>
+          <p:cNvSpPr>
+            <a:spLocks noGrp="1"/>
+          </p:cNvSpPr>
+          <p:nvPr>
+            <p:ph type="ctrTitle"/>
+          </p:nvPr>
+        </p:nvSpPr>
+        <p:spPr/>
+        <p:txBody>
+          <a:bodyPr/>
+          <a:lstStyle/>
+          <a:p>
+            <a:r>
+              <a:rPr lang="en-AT" dirty="0"/>
+              <a:t>RML – Zero-Shot</a:t>
+            </a:r>
+          </a:p>
+        </p:txBody>
+      </p:sp>
+      <p:pic>
+        <p:nvPicPr>
+          <p:cNvPr id="13" name="Content Placeholder 12" descr="A screen shot of a computer&#10;&#10;Description automatically generated">
+            <a:extLst>
+              <a:ext uri="{FF2B5EF4-FFF2-40B4-BE49-F238E27FC236}">
+                <a16:creationId xmlns:a16="http://schemas.microsoft.com/office/drawing/2014/main" id="{04594947-474F-9A47-028A-75BD799CA892}"/>
+              </a:ext>
+            </a:extLst>
+          </p:cNvPr>
+          <p:cNvPicPr>
+            <a:picLocks noGrp="1" noChangeAspect="1"/>
+          </p:cNvPicPr>
+          <p:nvPr>
+            <p:ph sz="half" idx="13"/>
+          </p:nvPr>
+        </p:nvPicPr>
+        <p:blipFill>
+          <a:blip r:embed="rId2"/>
+          <a:stretch>
+            <a:fillRect/>
+          </a:stretch>
+        </p:blipFill>
+        <p:spPr>
+          <a:xfrm>
+            <a:off x="6717646" y="450728"/>
+            <a:ext cx="4707591" cy="5956544"/>
+          </a:xfrm>
+        </p:spPr>
+      </p:pic>
+      <p:pic>
+        <p:nvPicPr>
+          <p:cNvPr id="16" name="Picture 15" descr="A screenshot of a computer&#10;&#10;Description automatically generated">
+            <a:extLst>
+              <a:ext uri="{FF2B5EF4-FFF2-40B4-BE49-F238E27FC236}">
+                <a16:creationId xmlns:a16="http://schemas.microsoft.com/office/drawing/2014/main" id="{6EF9B453-FE21-E26D-D3E4-CF724D4BB492}"/>
+              </a:ext>
+            </a:extLst>
+          </p:cNvPr>
+          <p:cNvPicPr>
+            <a:picLocks noChangeAspect="1"/>
+          </p:cNvPicPr>
+          <p:nvPr/>
+        </p:nvPicPr>
+        <p:blipFill>
+          <a:blip r:embed="rId3"/>
+          <a:stretch>
+            <a:fillRect/>
+          </a:stretch>
+        </p:blipFill>
+        <p:spPr>
+          <a:xfrm>
+            <a:off x="766763" y="2491910"/>
+            <a:ext cx="5088659" cy="2018642"/>
+          </a:xfrm>
+          <a:prstGeom prst="rect">
+            <a:avLst/>
+          </a:prstGeom>
+        </p:spPr>
+      </p:pic>
+    </p:spTree>
+    <p:extLst>
+      <p:ext uri="{BB962C8B-B14F-4D97-AF65-F5344CB8AC3E}">
+        <p14:creationId xmlns:p14="http://schemas.microsoft.com/office/powerpoint/2010/main" val="3783565773"/>
+      </p:ext>
+    </p:extLst>
+  </p:cSld>
+  <p:clrMapOvr>
+    <a:masterClrMapping/>
+  </p:clrMapOvr>
+</p:sld>
+</file>
+
+<file path=ppt/slides/slide18.xml><?xml version="1.0" encoding="utf-8"?>
 <p:sld xmlns:a="http://schemas.openxmlformats.org/drawingml/2006/main" xmlns:r="http://schemas.openxmlformats.org/officeDocument/2006/relationships" xmlns:p="http://schemas.openxmlformats.org/presentationml/2006/main">
   <p:cSld>
     <p:spTree>
@@ -5992,16 +6970,60 @@
           <a:bodyPr/>
           <a:lstStyle/>
           <a:p>
+            <a:r>
+              <a:rPr lang="en-AT" dirty="0"/>
+              <a:t>Provide an example desired output RDF</a:t>
+            </a:r>
+          </a:p>
+          <a:p>
+            <a:r>
+              <a:rPr lang="en-AT" dirty="0"/>
+              <a:t>Generate RML based on that</a:t>
+            </a:r>
+          </a:p>
+          <a:p>
             <a:endParaRPr lang="en-AT" dirty="0"/>
           </a:p>
-        </p:txBody>
-      </p:sp>
-      <p:sp>
-        <p:nvSpPr>
-          <p:cNvPr id="5" name="Content Placeholder 4">
-            <a:extLst>
-              <a:ext uri="{FF2B5EF4-FFF2-40B4-BE49-F238E27FC236}">
-                <a16:creationId xmlns:a16="http://schemas.microsoft.com/office/drawing/2014/main" id="{F44C7D32-8DC8-9538-25AA-7B02AAED91B8}"/>
+          <a:p>
+            <a:endParaRPr lang="en-AT" dirty="0"/>
+          </a:p>
+        </p:txBody>
+      </p:sp>
+      <p:pic>
+        <p:nvPicPr>
+          <p:cNvPr id="6" name="Content Placeholder 5" descr="A screenshot of a computer program&#10;&#10;Description automatically generated">
+            <a:extLst>
+              <a:ext uri="{FF2B5EF4-FFF2-40B4-BE49-F238E27FC236}">
+                <a16:creationId xmlns:a16="http://schemas.microsoft.com/office/drawing/2014/main" id="{C44270C7-C2C0-7AF6-10D0-859FE8778B2F}"/>
+              </a:ext>
+            </a:extLst>
+          </p:cNvPr>
+          <p:cNvPicPr>
+            <a:picLocks noGrp="1" noChangeAspect="1"/>
+          </p:cNvPicPr>
+          <p:nvPr>
+            <p:ph sz="half" idx="13"/>
+          </p:nvPr>
+        </p:nvPicPr>
+        <p:blipFill>
+          <a:blip r:embed="rId2"/>
+          <a:stretch>
+            <a:fillRect/>
+          </a:stretch>
+        </p:blipFill>
+        <p:spPr>
+          <a:xfrm>
+            <a:off x="364140" y="1932402"/>
+            <a:ext cx="5083683" cy="2993196"/>
+          </a:xfrm>
+        </p:spPr>
+      </p:pic>
+      <p:sp>
+        <p:nvSpPr>
+          <p:cNvPr id="3" name="Title 2">
+            <a:extLst>
+              <a:ext uri="{FF2B5EF4-FFF2-40B4-BE49-F238E27FC236}">
+                <a16:creationId xmlns:a16="http://schemas.microsoft.com/office/drawing/2014/main" id="{DE239DB9-4B56-E231-8C38-EAC4CAE9E1CA}"/>
               </a:ext>
             </a:extLst>
           </p:cNvPr>
@@ -6009,7 +7031,7 @@
             <a:spLocks noGrp="1"/>
           </p:cNvSpPr>
           <p:nvPr>
-            <p:ph sz="half" idx="13"/>
+            <p:ph type="ctrTitle"/>
           </p:nvPr>
         </p:nvSpPr>
         <p:spPr/>
@@ -6017,31 +7039,6 @@
           <a:bodyPr/>
           <a:lstStyle/>
           <a:p>
-            <a:endParaRPr lang="en-AT"/>
-          </a:p>
-        </p:txBody>
-      </p:sp>
-      <p:sp>
-        <p:nvSpPr>
-          <p:cNvPr id="3" name="Title 2">
-            <a:extLst>
-              <a:ext uri="{FF2B5EF4-FFF2-40B4-BE49-F238E27FC236}">
-                <a16:creationId xmlns:a16="http://schemas.microsoft.com/office/drawing/2014/main" id="{DE239DB9-4B56-E231-8C38-EAC4CAE9E1CA}"/>
-              </a:ext>
-            </a:extLst>
-          </p:cNvPr>
-          <p:cNvSpPr>
-            <a:spLocks noGrp="1"/>
-          </p:cNvSpPr>
-          <p:nvPr>
-            <p:ph type="ctrTitle"/>
-          </p:nvPr>
-        </p:nvSpPr>
-        <p:spPr/>
-        <p:txBody>
-          <a:bodyPr/>
-          <a:lstStyle/>
-          <a:p>
             <a:r>
               <a:rPr lang="en-AT" dirty="0"/>
               <a:t>RML – One-Shot</a:t>
@@ -6049,6 +7046,36 @@
           </a:p>
         </p:txBody>
       </p:sp>
+      <p:pic>
+        <p:nvPicPr>
+          <p:cNvPr id="8" name="Picture 7" descr="A computer screen shot of a program&#10;&#10;Description automatically generated">
+            <a:extLst>
+              <a:ext uri="{FF2B5EF4-FFF2-40B4-BE49-F238E27FC236}">
+                <a16:creationId xmlns:a16="http://schemas.microsoft.com/office/drawing/2014/main" id="{49D17BA2-530A-ADDB-09C2-DD442FCECDE5}"/>
+              </a:ext>
+            </a:extLst>
+          </p:cNvPr>
+          <p:cNvPicPr>
+            <a:picLocks noChangeAspect="1"/>
+          </p:cNvPicPr>
+          <p:nvPr/>
+        </p:nvPicPr>
+        <p:blipFill>
+          <a:blip r:embed="rId3"/>
+          <a:stretch>
+            <a:fillRect/>
+          </a:stretch>
+        </p:blipFill>
+        <p:spPr>
+          <a:xfrm>
+            <a:off x="5447823" y="567943"/>
+            <a:ext cx="6184900" cy="5473700"/>
+          </a:xfrm>
+          <a:prstGeom prst="rect">
+            <a:avLst/>
+          </a:prstGeom>
+        </p:spPr>
+      </p:pic>
     </p:spTree>
     <p:extLst>
       <p:ext uri="{BB962C8B-B14F-4D97-AF65-F5344CB8AC3E}">
@@ -6062,7 +7089,7 @@
 </p:sld>
 </file>
 
-<file path=ppt/slides/slide16.xml><?xml version="1.0" encoding="utf-8"?>
+<file path=ppt/slides/slide19.xml><?xml version="1.0" encoding="utf-8"?>
 <p:sld xmlns:a="http://schemas.openxmlformats.org/drawingml/2006/main" xmlns:r="http://schemas.openxmlformats.org/officeDocument/2006/relationships" xmlns:p="http://schemas.openxmlformats.org/presentationml/2006/main">
   <p:cSld>
     <p:spTree>
@@ -6070,7 +7097,7 @@
         <p:cNvPr id="1" name="">
           <a:extLst>
             <a:ext uri="{FF2B5EF4-FFF2-40B4-BE49-F238E27FC236}">
-              <a16:creationId xmlns:a16="http://schemas.microsoft.com/office/drawing/2014/main" id="{3C4DFBBF-DE6C-8DBD-E066-BB3D87D1562C}"/>
+              <a16:creationId xmlns:a16="http://schemas.microsoft.com/office/drawing/2014/main" id="{B9FB40E8-74F9-F941-697B-2639B203C94D}"/>
             </a:ext>
           </a:extLst>
         </p:cNvPr>
@@ -6085,127 +7112,21 @@
           <a:chExt cx="0" cy="0"/>
         </a:xfrm>
       </p:grpSpPr>
-      <p:sp>
-        <p:nvSpPr>
-          <p:cNvPr id="4" name="Content Placeholder 3">
-            <a:extLst>
-              <a:ext uri="{FF2B5EF4-FFF2-40B4-BE49-F238E27FC236}">
-                <a16:creationId xmlns:a16="http://schemas.microsoft.com/office/drawing/2014/main" id="{79B49B3A-2A5B-CE6A-DCF4-6FCD3E843260}"/>
-              </a:ext>
-            </a:extLst>
-          </p:cNvPr>
-          <p:cNvSpPr>
-            <a:spLocks noGrp="1"/>
-          </p:cNvSpPr>
-          <p:nvPr>
-            <p:ph sz="half" idx="1"/>
-          </p:nvPr>
-        </p:nvSpPr>
-        <p:spPr/>
-        <p:txBody>
-          <a:bodyPr/>
-          <a:lstStyle/>
-          <a:p>
-            <a:endParaRPr lang="en-AT" dirty="0"/>
-          </a:p>
-        </p:txBody>
-      </p:sp>
-      <p:sp>
-        <p:nvSpPr>
-          <p:cNvPr id="5" name="Content Placeholder 4">
-            <a:extLst>
-              <a:ext uri="{FF2B5EF4-FFF2-40B4-BE49-F238E27FC236}">
-                <a16:creationId xmlns:a16="http://schemas.microsoft.com/office/drawing/2014/main" id="{5AA1137F-EC8B-73F0-26CD-1F2E69BCB1D2}"/>
-              </a:ext>
-            </a:extLst>
-          </p:cNvPr>
-          <p:cNvSpPr>
-            <a:spLocks noGrp="1"/>
-          </p:cNvSpPr>
-          <p:nvPr>
-            <p:ph sz="half" idx="13"/>
-          </p:nvPr>
-        </p:nvSpPr>
-        <p:spPr/>
-        <p:txBody>
-          <a:bodyPr/>
-          <a:lstStyle/>
-          <a:p>
-            <a:endParaRPr lang="en-AT"/>
-          </a:p>
-        </p:txBody>
-      </p:sp>
-      <p:sp>
-        <p:nvSpPr>
-          <p:cNvPr id="3" name="Title 2">
-            <a:extLst>
-              <a:ext uri="{FF2B5EF4-FFF2-40B4-BE49-F238E27FC236}">
-                <a16:creationId xmlns:a16="http://schemas.microsoft.com/office/drawing/2014/main" id="{02D3C5AA-D57F-0BD1-DAA7-B255826F0690}"/>
-              </a:ext>
-            </a:extLst>
-          </p:cNvPr>
-          <p:cNvSpPr>
-            <a:spLocks noGrp="1"/>
-          </p:cNvSpPr>
-          <p:nvPr>
-            <p:ph type="ctrTitle"/>
-          </p:nvPr>
-        </p:nvSpPr>
-        <p:spPr/>
-        <p:txBody>
-          <a:bodyPr/>
-          <a:lstStyle/>
-          <a:p>
-            <a:r>
-              <a:rPr lang="en-AT" dirty="0"/>
-              <a:t>RML – Few-Shot</a:t>
-            </a:r>
-          </a:p>
-        </p:txBody>
-      </p:sp>
-    </p:spTree>
-    <p:extLst>
-      <p:ext uri="{BB962C8B-B14F-4D97-AF65-F5344CB8AC3E}">
-        <p14:creationId xmlns:p14="http://schemas.microsoft.com/office/powerpoint/2010/main" val="1975731055"/>
-      </p:ext>
-    </p:extLst>
-  </p:cSld>
-  <p:clrMapOvr>
-    <a:masterClrMapping/>
-  </p:clrMapOvr>
-</p:sld>
-</file>
-
-<file path=ppt/slides/slide17.xml><?xml version="1.0" encoding="utf-8"?>
-<p:sld xmlns:a="http://schemas.openxmlformats.org/drawingml/2006/main" xmlns:r="http://schemas.openxmlformats.org/officeDocument/2006/relationships" xmlns:p="http://schemas.openxmlformats.org/presentationml/2006/main">
-  <p:cSld>
-    <p:spTree>
-      <p:nvGrpSpPr>
-        <p:cNvPr id="1" name=""/>
-        <p:cNvGrpSpPr/>
-        <p:nvPr/>
-      </p:nvGrpSpPr>
-      <p:grpSpPr>
-        <a:xfrm>
-          <a:off x="0" y="0"/>
-          <a:ext cx="0" cy="0"/>
-          <a:chOff x="0" y="0"/>
-          <a:chExt cx="0" cy="0"/>
-        </a:xfrm>
-      </p:grpSpPr>
       <p:pic>
         <p:nvPicPr>
-          <p:cNvPr id="3" name="Grafik 2">
-            <a:extLst>
-              <a:ext uri="{FF2B5EF4-FFF2-40B4-BE49-F238E27FC236}">
-                <a16:creationId xmlns:a16="http://schemas.microsoft.com/office/drawing/2014/main" id="{3711D89E-E6C8-955A-36C2-735A5787F660}"/>
+          <p:cNvPr id="9" name="Content Placeholder 8" descr="A screen shot of a computer&#10;&#10;Description automatically generated">
+            <a:extLst>
+              <a:ext uri="{FF2B5EF4-FFF2-40B4-BE49-F238E27FC236}">
+                <a16:creationId xmlns:a16="http://schemas.microsoft.com/office/drawing/2014/main" id="{CCBBA6E2-3DC4-DB42-7B46-8B10D65249E7}"/>
               </a:ext>
             </a:extLst>
           </p:cNvPr>
           <p:cNvPicPr>
-            <a:picLocks noChangeAspect="1"/>
+            <a:picLocks noGrp="1" noChangeAspect="1"/>
           </p:cNvPicPr>
-          <p:nvPr/>
+          <p:nvPr>
+            <p:ph sz="half" idx="1"/>
+          </p:nvPr>
         </p:nvPicPr>
         <p:blipFill>
           <a:blip r:embed="rId2"/>
@@ -6215,18 +7136,43 @@
         </p:blipFill>
         <p:spPr>
           <a:xfrm>
-            <a:off x="-1" y="0"/>
-            <a:ext cx="12274475" cy="6904392"/>
+            <a:off x="3964449" y="138383"/>
+            <a:ext cx="4263101" cy="6581234"/>
           </a:xfrm>
-          <a:prstGeom prst="rect">
-            <a:avLst/>
-          </a:prstGeom>
         </p:spPr>
       </p:pic>
+      <p:sp>
+        <p:nvSpPr>
+          <p:cNvPr id="3" name="Title 2">
+            <a:extLst>
+              <a:ext uri="{FF2B5EF4-FFF2-40B4-BE49-F238E27FC236}">
+                <a16:creationId xmlns:a16="http://schemas.microsoft.com/office/drawing/2014/main" id="{C0799F57-F5D3-5FD2-48B7-5BAEE66B4403}"/>
+              </a:ext>
+            </a:extLst>
+          </p:cNvPr>
+          <p:cNvSpPr>
+            <a:spLocks noGrp="1"/>
+          </p:cNvSpPr>
+          <p:nvPr>
+            <p:ph type="ctrTitle"/>
+          </p:nvPr>
+        </p:nvSpPr>
+        <p:spPr/>
+        <p:txBody>
+          <a:bodyPr/>
+          <a:lstStyle/>
+          <a:p>
+            <a:r>
+              <a:rPr lang="en-AT" dirty="0"/>
+              <a:t>RML – One-Shot</a:t>
+            </a:r>
+          </a:p>
+        </p:txBody>
+      </p:sp>
     </p:spTree>
     <p:extLst>
       <p:ext uri="{BB962C8B-B14F-4D97-AF65-F5344CB8AC3E}">
-        <p14:creationId xmlns:p14="http://schemas.microsoft.com/office/powerpoint/2010/main" val="3670960750"/>
+        <p14:creationId xmlns:p14="http://schemas.microsoft.com/office/powerpoint/2010/main" val="3014666407"/>
       </p:ext>
     </p:extLst>
   </p:cSld>
@@ -6480,6 +7426,180 @@
     <p:extLst>
       <p:ext uri="{BB962C8B-B14F-4D97-AF65-F5344CB8AC3E}">
         <p14:creationId xmlns:p14="http://schemas.microsoft.com/office/powerpoint/2010/main" val="3097112045"/>
+      </p:ext>
+    </p:extLst>
+  </p:cSld>
+  <p:clrMapOvr>
+    <a:masterClrMapping/>
+  </p:clrMapOvr>
+</p:sld>
+</file>
+
+<file path=ppt/slides/slide20.xml><?xml version="1.0" encoding="utf-8"?>
+<p:sld xmlns:a="http://schemas.openxmlformats.org/drawingml/2006/main" xmlns:r="http://schemas.openxmlformats.org/officeDocument/2006/relationships" xmlns:p="http://schemas.openxmlformats.org/presentationml/2006/main">
+  <p:cSld>
+    <p:spTree>
+      <p:nvGrpSpPr>
+        <p:cNvPr id="1" name="">
+          <a:extLst>
+            <a:ext uri="{FF2B5EF4-FFF2-40B4-BE49-F238E27FC236}">
+              <a16:creationId xmlns:a16="http://schemas.microsoft.com/office/drawing/2014/main" id="{3C4DFBBF-DE6C-8DBD-E066-BB3D87D1562C}"/>
+            </a:ext>
+          </a:extLst>
+        </p:cNvPr>
+        <p:cNvGrpSpPr/>
+        <p:nvPr/>
+      </p:nvGrpSpPr>
+      <p:grpSpPr>
+        <a:xfrm>
+          <a:off x="0" y="0"/>
+          <a:ext cx="0" cy="0"/>
+          <a:chOff x="0" y="0"/>
+          <a:chExt cx="0" cy="0"/>
+        </a:xfrm>
+      </p:grpSpPr>
+      <p:sp>
+        <p:nvSpPr>
+          <p:cNvPr id="4" name="Content Placeholder 3">
+            <a:extLst>
+              <a:ext uri="{FF2B5EF4-FFF2-40B4-BE49-F238E27FC236}">
+                <a16:creationId xmlns:a16="http://schemas.microsoft.com/office/drawing/2014/main" id="{79B49B3A-2A5B-CE6A-DCF4-6FCD3E843260}"/>
+              </a:ext>
+            </a:extLst>
+          </p:cNvPr>
+          <p:cNvSpPr>
+            <a:spLocks noGrp="1"/>
+          </p:cNvSpPr>
+          <p:nvPr>
+            <p:ph sz="half" idx="1"/>
+          </p:nvPr>
+        </p:nvSpPr>
+        <p:spPr/>
+        <p:txBody>
+          <a:bodyPr/>
+          <a:lstStyle/>
+          <a:p>
+            <a:endParaRPr lang="en-AT" dirty="0"/>
+          </a:p>
+        </p:txBody>
+      </p:sp>
+      <p:sp>
+        <p:nvSpPr>
+          <p:cNvPr id="5" name="Content Placeholder 4">
+            <a:extLst>
+              <a:ext uri="{FF2B5EF4-FFF2-40B4-BE49-F238E27FC236}">
+                <a16:creationId xmlns:a16="http://schemas.microsoft.com/office/drawing/2014/main" id="{5AA1137F-EC8B-73F0-26CD-1F2E69BCB1D2}"/>
+              </a:ext>
+            </a:extLst>
+          </p:cNvPr>
+          <p:cNvSpPr>
+            <a:spLocks noGrp="1"/>
+          </p:cNvSpPr>
+          <p:nvPr>
+            <p:ph sz="half" idx="13"/>
+          </p:nvPr>
+        </p:nvSpPr>
+        <p:spPr/>
+        <p:txBody>
+          <a:bodyPr/>
+          <a:lstStyle/>
+          <a:p>
+            <a:endParaRPr lang="en-AT"/>
+          </a:p>
+        </p:txBody>
+      </p:sp>
+      <p:sp>
+        <p:nvSpPr>
+          <p:cNvPr id="3" name="Title 2">
+            <a:extLst>
+              <a:ext uri="{FF2B5EF4-FFF2-40B4-BE49-F238E27FC236}">
+                <a16:creationId xmlns:a16="http://schemas.microsoft.com/office/drawing/2014/main" id="{02D3C5AA-D57F-0BD1-DAA7-B255826F0690}"/>
+              </a:ext>
+            </a:extLst>
+          </p:cNvPr>
+          <p:cNvSpPr>
+            <a:spLocks noGrp="1"/>
+          </p:cNvSpPr>
+          <p:nvPr>
+            <p:ph type="ctrTitle"/>
+          </p:nvPr>
+        </p:nvSpPr>
+        <p:spPr/>
+        <p:txBody>
+          <a:bodyPr/>
+          <a:lstStyle/>
+          <a:p>
+            <a:r>
+              <a:rPr lang="en-AT" dirty="0"/>
+              <a:t>RML – Few-Shot</a:t>
+            </a:r>
+          </a:p>
+        </p:txBody>
+      </p:sp>
+    </p:spTree>
+    <p:extLst>
+      <p:ext uri="{BB962C8B-B14F-4D97-AF65-F5344CB8AC3E}">
+        <p14:creationId xmlns:p14="http://schemas.microsoft.com/office/powerpoint/2010/main" val="1975731055"/>
+      </p:ext>
+    </p:extLst>
+  </p:cSld>
+  <p:clrMapOvr>
+    <a:masterClrMapping/>
+  </p:clrMapOvr>
+</p:sld>
+</file>
+
+<file path=ppt/slides/slide21.xml><?xml version="1.0" encoding="utf-8"?>
+<p:sld xmlns:a="http://schemas.openxmlformats.org/drawingml/2006/main" xmlns:r="http://schemas.openxmlformats.org/officeDocument/2006/relationships" xmlns:p="http://schemas.openxmlformats.org/presentationml/2006/main">
+  <p:cSld>
+    <p:spTree>
+      <p:nvGrpSpPr>
+        <p:cNvPr id="1" name=""/>
+        <p:cNvGrpSpPr/>
+        <p:nvPr/>
+      </p:nvGrpSpPr>
+      <p:grpSpPr>
+        <a:xfrm>
+          <a:off x="0" y="0"/>
+          <a:ext cx="0" cy="0"/>
+          <a:chOff x="0" y="0"/>
+          <a:chExt cx="0" cy="0"/>
+        </a:xfrm>
+      </p:grpSpPr>
+      <p:pic>
+        <p:nvPicPr>
+          <p:cNvPr id="3" name="Grafik 2">
+            <a:extLst>
+              <a:ext uri="{FF2B5EF4-FFF2-40B4-BE49-F238E27FC236}">
+                <a16:creationId xmlns:a16="http://schemas.microsoft.com/office/drawing/2014/main" id="{3711D89E-E6C8-955A-36C2-735A5787F660}"/>
+              </a:ext>
+            </a:extLst>
+          </p:cNvPr>
+          <p:cNvPicPr>
+            <a:picLocks noChangeAspect="1"/>
+          </p:cNvPicPr>
+          <p:nvPr/>
+        </p:nvPicPr>
+        <p:blipFill>
+          <a:blip r:embed="rId2"/>
+          <a:stretch>
+            <a:fillRect/>
+          </a:stretch>
+        </p:blipFill>
+        <p:spPr>
+          <a:xfrm>
+            <a:off x="-1" y="0"/>
+            <a:ext cx="12274475" cy="6904392"/>
+          </a:xfrm>
+          <a:prstGeom prst="rect">
+            <a:avLst/>
+          </a:prstGeom>
+        </p:spPr>
+      </p:pic>
+    </p:spTree>
+    <p:extLst>
+      <p:ext uri="{BB962C8B-B14F-4D97-AF65-F5344CB8AC3E}">
+        <p14:creationId xmlns:p14="http://schemas.microsoft.com/office/powerpoint/2010/main" val="3670960750"/>
       </p:ext>
     </p:extLst>
   </p:cSld>

</xml_diff>